<commit_message>
Site updated: 2020-04-26 22:08:18
</commit_message>
<xml_diff>
--- a/images/text_classification_images/figures.pptx
+++ b/images/text_classification_images/figures.pptx
@@ -5,7 +5,7 @@
     <p:sldMasterId id="2147483659" r:id="rId1"/>
   </p:sldMasterIdLst>
   <p:notesMasterIdLst>
-    <p:notesMasterId r:id="rId10"/>
+    <p:notesMasterId r:id="rId12"/>
   </p:notesMasterIdLst>
   <p:sldIdLst>
     <p:sldId id="268" r:id="rId2"/>
@@ -13,37 +13,39 @@
     <p:sldId id="271" r:id="rId4"/>
     <p:sldId id="270" r:id="rId5"/>
     <p:sldId id="269" r:id="rId6"/>
-    <p:sldId id="265" r:id="rId7"/>
-    <p:sldId id="267" r:id="rId8"/>
-    <p:sldId id="273" r:id="rId9"/>
+    <p:sldId id="274" r:id="rId7"/>
+    <p:sldId id="265" r:id="rId8"/>
+    <p:sldId id="267" r:id="rId9"/>
+    <p:sldId id="273" r:id="rId10"/>
+    <p:sldId id="275" r:id="rId11"/>
   </p:sldIdLst>
   <p:sldSz cx="6858000" cy="5143500"/>
   <p:notesSz cx="6858000" cy="9144000"/>
   <p:embeddedFontLst>
     <p:embeddedFont>
       <p:font typeface="Cambria Math" panose="02040503050406030204" pitchFamily="18" charset="0"/>
-      <p:regular r:id="rId11"/>
+      <p:regular r:id="rId13"/>
     </p:embeddedFont>
     <p:embeddedFont>
       <p:font typeface="Consolas" panose="020B0609020204030204" pitchFamily="49" charset="0"/>
-      <p:regular r:id="rId12"/>
-      <p:bold r:id="rId13"/>
-      <p:italic r:id="rId14"/>
-      <p:boldItalic r:id="rId15"/>
+      <p:regular r:id="rId14"/>
+      <p:bold r:id="rId15"/>
+      <p:italic r:id="rId16"/>
+      <p:boldItalic r:id="rId17"/>
     </p:embeddedFont>
     <p:embeddedFont>
       <p:font typeface="Work Sans" panose="02010600030101010101" charset="0"/>
-      <p:regular r:id="rId16"/>
-      <p:bold r:id="rId17"/>
-    </p:embeddedFont>
-    <p:embeddedFont>
-      <p:font typeface="等线" panose="02010600030101010101" pitchFamily="2" charset="-122"/>
       <p:regular r:id="rId18"/>
       <p:bold r:id="rId19"/>
     </p:embeddedFont>
     <p:embeddedFont>
+      <p:font typeface="等线" panose="02010600030101010101" pitchFamily="2" charset="-122"/>
+      <p:regular r:id="rId20"/>
+      <p:bold r:id="rId21"/>
+    </p:embeddedFont>
+    <p:embeddedFont>
       <p:font typeface="等线 Light" panose="02010600030101010101" pitchFamily="2" charset="-122"/>
-      <p:regular r:id="rId20"/>
+      <p:regular r:id="rId22"/>
     </p:embeddedFont>
   </p:embeddedFontLst>
   <p:defaultTextStyle>
@@ -525,6 +527,135 @@
     <p:extLst>
       <p:ext uri="{BB962C8B-B14F-4D97-AF65-F5344CB8AC3E}">
         <p14:creationId xmlns:p14="http://schemas.microsoft.com/office/powerpoint/2010/main" val="3784904280"/>
+      </p:ext>
+    </p:extLst>
+  </p:cSld>
+  <p:clrMapOvr>
+    <a:masterClrMapping/>
+  </p:clrMapOvr>
+</p:notes>
+</file>
+
+<file path=ppt/notesSlides/notesSlide10.xml><?xml version="1.0" encoding="utf-8"?>
+<p:notes xmlns:a="http://schemas.openxmlformats.org/drawingml/2006/main" xmlns:r="http://schemas.openxmlformats.org/officeDocument/2006/relationships" xmlns:p="http://schemas.openxmlformats.org/presentationml/2006/main" showMasterSp="0" showMasterPhAnim="0">
+  <p:cSld>
+    <p:spTree>
+      <p:nvGrpSpPr>
+        <p:cNvPr id="1" name="Shape 155"/>
+        <p:cNvGrpSpPr/>
+        <p:nvPr/>
+      </p:nvGrpSpPr>
+      <p:grpSpPr>
+        <a:xfrm>
+          <a:off x="0" y="0"/>
+          <a:ext cx="0" cy="0"/>
+          <a:chOff x="0" y="0"/>
+          <a:chExt cx="0" cy="0"/>
+        </a:xfrm>
+      </p:grpSpPr>
+      <p:sp>
+        <p:nvSpPr>
+          <p:cNvPr id="156" name="Shape 156"/>
+          <p:cNvSpPr>
+            <a:spLocks noGrp="1" noRot="1" noChangeAspect="1"/>
+          </p:cNvSpPr>
+          <p:nvPr>
+            <p:ph type="sldImg" idx="2"/>
+          </p:nvPr>
+        </p:nvSpPr>
+        <p:spPr>
+          <a:xfrm>
+            <a:off x="1143000" y="685800"/>
+            <a:ext cx="4572000" cy="3429000"/>
+          </a:xfrm>
+          <a:custGeom>
+            <a:avLst/>
+            <a:gdLst/>
+            <a:ahLst/>
+            <a:cxnLst/>
+            <a:rect l="0" t="0" r="0" b="0"/>
+            <a:pathLst>
+              <a:path w="120000" h="120000" extrusionOk="0">
+                <a:moveTo>
+                  <a:pt x="0" y="0"/>
+                </a:moveTo>
+                <a:lnTo>
+                  <a:pt x="120000" y="0"/>
+                </a:lnTo>
+                <a:lnTo>
+                  <a:pt x="120000" y="120000"/>
+                </a:lnTo>
+                <a:lnTo>
+                  <a:pt x="0" y="120000"/>
+                </a:lnTo>
+                <a:close/>
+              </a:path>
+            </a:pathLst>
+          </a:custGeom>
+        </p:spPr>
+      </p:sp>
+      <p:sp>
+        <p:nvSpPr>
+          <p:cNvPr id="157" name="Shape 157"/>
+          <p:cNvSpPr txBox="1">
+            <a:spLocks noGrp="1"/>
+          </p:cNvSpPr>
+          <p:nvPr>
+            <p:ph type="body" idx="1"/>
+          </p:nvPr>
+        </p:nvSpPr>
+        <p:spPr>
+          <a:xfrm>
+            <a:off x="685800" y="4343400"/>
+            <a:ext cx="5486400" cy="4114800"/>
+          </a:xfrm>
+          <a:prstGeom prst="rect">
+            <a:avLst/>
+          </a:prstGeom>
+        </p:spPr>
+        <p:txBody>
+          <a:bodyPr wrap="square" lIns="91425" tIns="91425" rIns="91425" bIns="91425" anchor="t" anchorCtr="0">
+            <a:noAutofit/>
+          </a:bodyPr>
+          <a:lstStyle/>
+          <a:p>
+            <a:pPr marL="0" marR="0" lvl="0" indent="0" algn="l" defTabSz="914400" rtl="0" eaLnBrk="1" fontAlgn="auto" latinLnBrk="0" hangingPunct="1">
+              <a:lnSpc>
+                <a:spcPct val="100000"/>
+              </a:lnSpc>
+              <a:spcBef>
+                <a:spcPts val="0"/>
+              </a:spcBef>
+              <a:spcAft>
+                <a:spcPts val="0"/>
+              </a:spcAft>
+              <a:buClrTx/>
+              <a:buSzTx/>
+              <a:buFontTx/>
+              <a:buNone/>
+              <a:tabLst/>
+              <a:defRPr/>
+            </a:pPr>
+            <a:r>
+              <a:rPr lang="en-US" altLang="zh-CN" dirty="0"/>
+              <a:t>Transformer-Encoder</a:t>
+            </a:r>
+          </a:p>
+          <a:p>
+            <a:pPr lvl="0" rtl="0">
+              <a:spcBef>
+                <a:spcPts val="0"/>
+              </a:spcBef>
+              <a:buNone/>
+            </a:pPr>
+            <a:endParaRPr lang="en-US" altLang="zh-CN" dirty="0"/>
+          </a:p>
+        </p:txBody>
+      </p:sp>
+    </p:spTree>
+    <p:extLst>
+      <p:ext uri="{BB962C8B-B14F-4D97-AF65-F5344CB8AC3E}">
+        <p14:creationId xmlns:p14="http://schemas.microsoft.com/office/powerpoint/2010/main" val="22808608"/>
       </p:ext>
     </p:extLst>
   </p:cSld>
@@ -1106,6 +1237,135 @@
           </a:bodyPr>
           <a:lstStyle/>
           <a:p>
+            <a:pPr marL="0" marR="0" lvl="0" indent="0" algn="l" defTabSz="914400" rtl="0" eaLnBrk="1" fontAlgn="auto" latinLnBrk="0" hangingPunct="1">
+              <a:lnSpc>
+                <a:spcPct val="100000"/>
+              </a:lnSpc>
+              <a:spcBef>
+                <a:spcPts val="0"/>
+              </a:spcBef>
+              <a:spcAft>
+                <a:spcPts val="0"/>
+              </a:spcAft>
+              <a:buClrTx/>
+              <a:buSzTx/>
+              <a:buFontTx/>
+              <a:buNone/>
+              <a:tabLst/>
+              <a:defRPr/>
+            </a:pPr>
+            <a:r>
+              <a:rPr lang="en-US" altLang="zh-CN" sz="1100" b="0" i="0" kern="1200" dirty="0" err="1">
+                <a:solidFill>
+                  <a:schemeClr val="tx1"/>
+                </a:solidFill>
+                <a:effectLst/>
+                <a:latin typeface="+mn-lt"/>
+                <a:ea typeface="+mn-ea"/>
+                <a:cs typeface="+mn-cs"/>
+              </a:rPr>
+              <a:t>TextSelfAtt-BiRNN</a:t>
+            </a:r>
+            <a:endParaRPr lang="en-US" altLang="zh-CN" dirty="0"/>
+          </a:p>
+        </p:txBody>
+      </p:sp>
+    </p:spTree>
+    <p:extLst>
+      <p:ext uri="{BB962C8B-B14F-4D97-AF65-F5344CB8AC3E}">
+        <p14:creationId xmlns:p14="http://schemas.microsoft.com/office/powerpoint/2010/main" val="2111904358"/>
+      </p:ext>
+    </p:extLst>
+  </p:cSld>
+  <p:clrMapOvr>
+    <a:masterClrMapping/>
+  </p:clrMapOvr>
+</p:notes>
+</file>
+
+<file path=ppt/notesSlides/notesSlide7.xml><?xml version="1.0" encoding="utf-8"?>
+<p:notes xmlns:a="http://schemas.openxmlformats.org/drawingml/2006/main" xmlns:r="http://schemas.openxmlformats.org/officeDocument/2006/relationships" xmlns:p="http://schemas.openxmlformats.org/presentationml/2006/main" showMasterSp="0" showMasterPhAnim="0">
+  <p:cSld>
+    <p:spTree>
+      <p:nvGrpSpPr>
+        <p:cNvPr id="1" name="Shape 155"/>
+        <p:cNvGrpSpPr/>
+        <p:nvPr/>
+      </p:nvGrpSpPr>
+      <p:grpSpPr>
+        <a:xfrm>
+          <a:off x="0" y="0"/>
+          <a:ext cx="0" cy="0"/>
+          <a:chOff x="0" y="0"/>
+          <a:chExt cx="0" cy="0"/>
+        </a:xfrm>
+      </p:grpSpPr>
+      <p:sp>
+        <p:nvSpPr>
+          <p:cNvPr id="156" name="Shape 156"/>
+          <p:cNvSpPr>
+            <a:spLocks noGrp="1" noRot="1" noChangeAspect="1"/>
+          </p:cNvSpPr>
+          <p:nvPr>
+            <p:ph type="sldImg" idx="2"/>
+          </p:nvPr>
+        </p:nvSpPr>
+        <p:spPr>
+          <a:xfrm>
+            <a:off x="1143000" y="685800"/>
+            <a:ext cx="4572000" cy="3429000"/>
+          </a:xfrm>
+          <a:custGeom>
+            <a:avLst/>
+            <a:gdLst/>
+            <a:ahLst/>
+            <a:cxnLst/>
+            <a:rect l="0" t="0" r="0" b="0"/>
+            <a:pathLst>
+              <a:path w="120000" h="120000" extrusionOk="0">
+                <a:moveTo>
+                  <a:pt x="0" y="0"/>
+                </a:moveTo>
+                <a:lnTo>
+                  <a:pt x="120000" y="0"/>
+                </a:lnTo>
+                <a:lnTo>
+                  <a:pt x="120000" y="120000"/>
+                </a:lnTo>
+                <a:lnTo>
+                  <a:pt x="0" y="120000"/>
+                </a:lnTo>
+                <a:close/>
+              </a:path>
+            </a:pathLst>
+          </a:custGeom>
+        </p:spPr>
+      </p:sp>
+      <p:sp>
+        <p:nvSpPr>
+          <p:cNvPr id="157" name="Shape 157"/>
+          <p:cNvSpPr txBox="1">
+            <a:spLocks noGrp="1"/>
+          </p:cNvSpPr>
+          <p:nvPr>
+            <p:ph type="body" idx="1"/>
+          </p:nvPr>
+        </p:nvSpPr>
+        <p:spPr>
+          <a:xfrm>
+            <a:off x="685800" y="4343400"/>
+            <a:ext cx="5486400" cy="4114800"/>
+          </a:xfrm>
+          <a:prstGeom prst="rect">
+            <a:avLst/>
+          </a:prstGeom>
+        </p:spPr>
+        <p:txBody>
+          <a:bodyPr wrap="square" lIns="91425" tIns="91425" rIns="91425" bIns="91425" anchor="t" anchorCtr="0">
+            <a:noAutofit/>
+          </a:bodyPr>
+          <a:lstStyle/>
+          <a:p>
             <a:pPr lvl="0" rtl="0">
               <a:spcBef>
                 <a:spcPts val="0"/>
@@ -1132,7 +1392,7 @@
 </p:notes>
 </file>
 
-<file path=ppt/notesSlides/notesSlide7.xml><?xml version="1.0" encoding="utf-8"?>
+<file path=ppt/notesSlides/notesSlide8.xml><?xml version="1.0" encoding="utf-8"?>
 <p:notes xmlns:a="http://schemas.openxmlformats.org/drawingml/2006/main" xmlns:r="http://schemas.openxmlformats.org/officeDocument/2006/relationships" xmlns:p="http://schemas.openxmlformats.org/presentationml/2006/main" showMasterSp="0" showMasterPhAnim="0">
   <p:cSld>
     <p:spTree>
@@ -1261,7 +1521,7 @@
 </p:notes>
 </file>
 
-<file path=ppt/notesSlides/notesSlide8.xml><?xml version="1.0" encoding="utf-8"?>
+<file path=ppt/notesSlides/notesSlide9.xml><?xml version="1.0" encoding="utf-8"?>
 <p:notes xmlns:a="http://schemas.openxmlformats.org/drawingml/2006/main" xmlns:r="http://schemas.openxmlformats.org/officeDocument/2006/relationships" xmlns:p="http://schemas.openxmlformats.org/presentationml/2006/main" showMasterSp="0" showMasterPhAnim="0">
   <p:cSld>
     <p:spTree>
@@ -1538,7 +1798,7 @@
           <a:p>
             <a:fld id="{6E93A079-4161-4784-B083-CB61678532ED}" type="datetimeFigureOut">
               <a:rPr lang="zh-CN" altLang="en-US" smtClean="0"/>
-              <a:t>2019/1/9</a:t>
+              <a:t>2020/4/26</a:t>
             </a:fld>
             <a:endParaRPr lang="zh-CN" altLang="en-US"/>
           </a:p>
@@ -1755,7 +2015,7 @@
           <a:p>
             <a:fld id="{6E93A079-4161-4784-B083-CB61678532ED}" type="datetimeFigureOut">
               <a:rPr lang="zh-CN" altLang="en-US" smtClean="0"/>
-              <a:t>2019/1/9</a:t>
+              <a:t>2020/4/26</a:t>
             </a:fld>
             <a:endParaRPr lang="zh-CN" altLang="en-US"/>
           </a:p>
@@ -1982,7 +2242,7 @@
           <a:p>
             <a:fld id="{6E93A079-4161-4784-B083-CB61678532ED}" type="datetimeFigureOut">
               <a:rPr lang="zh-CN" altLang="en-US" smtClean="0"/>
-              <a:t>2019/1/9</a:t>
+              <a:t>2020/4/26</a:t>
             </a:fld>
             <a:endParaRPr lang="zh-CN" altLang="en-US"/>
           </a:p>
@@ -2527,7 +2787,7 @@
           <a:p>
             <a:fld id="{6E93A079-4161-4784-B083-CB61678532ED}" type="datetimeFigureOut">
               <a:rPr lang="zh-CN" altLang="en-US" smtClean="0"/>
-              <a:t>2019/1/9</a:t>
+              <a:t>2020/4/26</a:t>
             </a:fld>
             <a:endParaRPr lang="zh-CN" altLang="en-US"/>
           </a:p>
@@ -2821,7 +3081,7 @@
           <a:p>
             <a:fld id="{6E93A079-4161-4784-B083-CB61678532ED}" type="datetimeFigureOut">
               <a:rPr lang="zh-CN" altLang="en-US" smtClean="0"/>
-              <a:t>2019/1/9</a:t>
+              <a:t>2020/4/26</a:t>
             </a:fld>
             <a:endParaRPr lang="zh-CN" altLang="en-US"/>
           </a:p>
@@ -3105,7 +3365,7 @@
           <a:p>
             <a:fld id="{6E93A079-4161-4784-B083-CB61678532ED}" type="datetimeFigureOut">
               <a:rPr lang="zh-CN" altLang="en-US" smtClean="0"/>
-              <a:t>2019/1/9</a:t>
+              <a:t>2020/4/26</a:t>
             </a:fld>
             <a:endParaRPr lang="zh-CN" altLang="en-US"/>
           </a:p>
@@ -3536,7 +3796,7 @@
           <a:p>
             <a:fld id="{6E93A079-4161-4784-B083-CB61678532ED}" type="datetimeFigureOut">
               <a:rPr lang="zh-CN" altLang="en-US" smtClean="0"/>
-              <a:t>2019/1/9</a:t>
+              <a:t>2020/4/26</a:t>
             </a:fld>
             <a:endParaRPr lang="zh-CN" altLang="en-US"/>
           </a:p>
@@ -3696,7 +3956,7 @@
           <a:p>
             <a:fld id="{6E93A079-4161-4784-B083-CB61678532ED}" type="datetimeFigureOut">
               <a:rPr lang="zh-CN" altLang="en-US" smtClean="0"/>
-              <a:t>2019/1/9</a:t>
+              <a:t>2020/4/26</a:t>
             </a:fld>
             <a:endParaRPr lang="zh-CN" altLang="en-US"/>
           </a:p>
@@ -3828,7 +4088,7 @@
           <a:p>
             <a:fld id="{6E93A079-4161-4784-B083-CB61678532ED}" type="datetimeFigureOut">
               <a:rPr lang="zh-CN" altLang="en-US" smtClean="0"/>
-              <a:t>2019/1/9</a:t>
+              <a:t>2020/4/26</a:t>
             </a:fld>
             <a:endParaRPr lang="zh-CN" altLang="en-US"/>
           </a:p>
@@ -4158,7 +4418,7 @@
           <a:p>
             <a:fld id="{6E93A079-4161-4784-B083-CB61678532ED}" type="datetimeFigureOut">
               <a:rPr lang="zh-CN" altLang="en-US" smtClean="0"/>
-              <a:t>2019/1/9</a:t>
+              <a:t>2020/4/26</a:t>
             </a:fld>
             <a:endParaRPr lang="zh-CN" altLang="en-US"/>
           </a:p>
@@ -4465,7 +4725,7 @@
           <a:p>
             <a:fld id="{6E93A079-4161-4784-B083-CB61678532ED}" type="datetimeFigureOut">
               <a:rPr lang="zh-CN" altLang="en-US" smtClean="0"/>
-              <a:t>2019/1/9</a:t>
+              <a:t>2020/4/26</a:t>
             </a:fld>
             <a:endParaRPr lang="zh-CN" altLang="en-US"/>
           </a:p>
@@ -4725,7 +4985,7 @@
           <a:p>
             <a:fld id="{6E93A079-4161-4784-B083-CB61678532ED}" type="datetimeFigureOut">
               <a:rPr lang="zh-CN" altLang="en-US" smtClean="0"/>
-              <a:t>2019/1/9</a:t>
+              <a:t>2020/4/26</a:t>
             </a:fld>
             <a:endParaRPr lang="zh-CN" altLang="en-US"/>
           </a:p>
@@ -5936,6 +6196,1869 @@
     <p:extLst>
       <p:ext uri="{BB962C8B-B14F-4D97-AF65-F5344CB8AC3E}">
         <p14:creationId xmlns:p14="http://schemas.microsoft.com/office/powerpoint/2010/main" val="3854340446"/>
+      </p:ext>
+    </p:extLst>
+  </p:cSld>
+  <p:clrMapOvr>
+    <a:masterClrMapping/>
+  </p:clrMapOvr>
+</p:sld>
+</file>
+
+<file path=ppt/slides/slide10.xml><?xml version="1.0" encoding="utf-8"?>
+<p:sld xmlns:a="http://schemas.openxmlformats.org/drawingml/2006/main" xmlns:r="http://schemas.openxmlformats.org/officeDocument/2006/relationships" xmlns:p="http://schemas.openxmlformats.org/presentationml/2006/main">
+  <p:cSld>
+    <p:spTree>
+      <p:nvGrpSpPr>
+        <p:cNvPr id="1" name="Shape 158"/>
+        <p:cNvGrpSpPr/>
+        <p:nvPr/>
+      </p:nvGrpSpPr>
+      <p:grpSpPr>
+        <a:xfrm>
+          <a:off x="0" y="0"/>
+          <a:ext cx="0" cy="0"/>
+          <a:chOff x="0" y="0"/>
+          <a:chExt cx="0" cy="0"/>
+        </a:xfrm>
+      </p:grpSpPr>
+      <p:sp>
+        <p:nvSpPr>
+          <p:cNvPr id="87" name="矩形: 圆角 86">
+            <a:extLst>
+              <a:ext uri="{FF2B5EF4-FFF2-40B4-BE49-F238E27FC236}">
+                <a16:creationId xmlns:a16="http://schemas.microsoft.com/office/drawing/2014/main" id="{C2715085-FC95-4869-A90E-FE520C3D2BF7}"/>
+              </a:ext>
+            </a:extLst>
+          </p:cNvPr>
+          <p:cNvSpPr/>
+          <p:nvPr/>
+        </p:nvSpPr>
+        <p:spPr>
+          <a:xfrm>
+            <a:off x="2083637" y="3998539"/>
+            <a:ext cx="982408" cy="283808"/>
+          </a:xfrm>
+          <a:prstGeom prst="roundRect">
+            <a:avLst>
+              <a:gd name="adj" fmla="val 50000"/>
+            </a:avLst>
+          </a:prstGeom>
+          <a:ln w="9525">
+            <a:solidFill>
+              <a:schemeClr val="tx1"/>
+            </a:solidFill>
+            <a:headEnd type="none" w="med" len="med"/>
+            <a:tailEnd type="triangle" w="med" len="med"/>
+          </a:ln>
+          <a:effectLst>
+            <a:outerShdw blurRad="50800" dist="38100" dir="2700000" algn="tl" rotWithShape="0">
+              <a:prstClr val="black">
+                <a:alpha val="40000"/>
+              </a:prstClr>
+            </a:outerShdw>
+          </a:effectLst>
+        </p:spPr>
+        <p:style>
+          <a:lnRef idx="2">
+            <a:schemeClr val="dk1"/>
+          </a:lnRef>
+          <a:fillRef idx="1">
+            <a:schemeClr val="lt1"/>
+          </a:fillRef>
+          <a:effectRef idx="0">
+            <a:schemeClr val="dk1"/>
+          </a:effectRef>
+          <a:fontRef idx="minor">
+            <a:schemeClr val="dk1"/>
+          </a:fontRef>
+        </p:style>
+        <p:txBody>
+          <a:bodyPr rtlCol="0" anchor="ctr"/>
+          <a:lstStyle/>
+          <a:p>
+            <a:pPr algn="ctr"/>
+            <a:r>
+              <a:rPr lang="en-US" altLang="zh-CN" sz="1100" dirty="0">
+                <a:latin typeface="Consolas" panose="020B0609020204030204" pitchFamily="49" charset="0"/>
+              </a:rPr>
+              <a:t>Embedding</a:t>
+            </a:r>
+            <a:endParaRPr lang="zh-CN" altLang="en-US" sz="1100" dirty="0">
+              <a:latin typeface="Consolas" panose="020B0609020204030204" pitchFamily="49" charset="0"/>
+            </a:endParaRPr>
+          </a:p>
+        </p:txBody>
+      </p:sp>
+      <p:cxnSp>
+        <p:nvCxnSpPr>
+          <p:cNvPr id="93" name="直接箭头连接符 92">
+            <a:extLst>
+              <a:ext uri="{FF2B5EF4-FFF2-40B4-BE49-F238E27FC236}">
+                <a16:creationId xmlns:a16="http://schemas.microsoft.com/office/drawing/2014/main" id="{6E9F7249-B3DC-44B4-A3C4-FB98DACB1CC0}"/>
+              </a:ext>
+            </a:extLst>
+          </p:cNvPr>
+          <p:cNvCxnSpPr>
+            <a:cxnSpLocks/>
+          </p:cNvCxnSpPr>
+          <p:nvPr/>
+        </p:nvCxnSpPr>
+        <p:spPr>
+          <a:xfrm flipV="1">
+            <a:off x="2574841" y="4282347"/>
+            <a:ext cx="0" cy="180809"/>
+          </a:xfrm>
+          <a:prstGeom prst="straightConnector1">
+            <a:avLst/>
+          </a:prstGeom>
+          <a:ln>
+            <a:solidFill>
+              <a:schemeClr val="tx1"/>
+            </a:solidFill>
+            <a:headEnd type="none" w="med" len="med"/>
+            <a:tailEnd type="triangle" w="med" len="med"/>
+          </a:ln>
+          <a:effectLst>
+            <a:outerShdw blurRad="50800" dist="38100" dir="2700000" algn="tl" rotWithShape="0">
+              <a:prstClr val="black">
+                <a:alpha val="40000"/>
+              </a:prstClr>
+            </a:outerShdw>
+          </a:effectLst>
+        </p:spPr>
+        <p:style>
+          <a:lnRef idx="1">
+            <a:schemeClr val="accent1"/>
+          </a:lnRef>
+          <a:fillRef idx="0">
+            <a:schemeClr val="accent1"/>
+          </a:fillRef>
+          <a:effectRef idx="0">
+            <a:schemeClr val="accent1"/>
+          </a:effectRef>
+          <a:fontRef idx="minor">
+            <a:schemeClr val="tx1"/>
+          </a:fontRef>
+        </p:style>
+      </p:cxnSp>
+      <p:cxnSp>
+        <p:nvCxnSpPr>
+          <p:cNvPr id="117" name="直接箭头连接符 116">
+            <a:extLst>
+              <a:ext uri="{FF2B5EF4-FFF2-40B4-BE49-F238E27FC236}">
+                <a16:creationId xmlns:a16="http://schemas.microsoft.com/office/drawing/2014/main" id="{D8458A2B-5D9B-4B23-9193-F0BFF608583D}"/>
+              </a:ext>
+            </a:extLst>
+          </p:cNvPr>
+          <p:cNvCxnSpPr>
+            <a:cxnSpLocks/>
+          </p:cNvCxnSpPr>
+          <p:nvPr/>
+        </p:nvCxnSpPr>
+        <p:spPr>
+          <a:xfrm flipV="1">
+            <a:off x="3821522" y="3817730"/>
+            <a:ext cx="0" cy="180809"/>
+          </a:xfrm>
+          <a:prstGeom prst="straightConnector1">
+            <a:avLst/>
+          </a:prstGeom>
+          <a:ln>
+            <a:solidFill>
+              <a:schemeClr val="tx1"/>
+            </a:solidFill>
+            <a:headEnd type="none" w="med" len="med"/>
+            <a:tailEnd type="triangle" w="med" len="med"/>
+          </a:ln>
+          <a:effectLst>
+            <a:outerShdw blurRad="50800" dist="38100" dir="2700000" algn="tl" rotWithShape="0">
+              <a:prstClr val="black">
+                <a:alpha val="40000"/>
+              </a:prstClr>
+            </a:outerShdw>
+          </a:effectLst>
+        </p:spPr>
+        <p:style>
+          <a:lnRef idx="1">
+            <a:schemeClr val="accent1"/>
+          </a:lnRef>
+          <a:fillRef idx="0">
+            <a:schemeClr val="accent1"/>
+          </a:fillRef>
+          <a:effectRef idx="0">
+            <a:schemeClr val="accent1"/>
+          </a:effectRef>
+          <a:fontRef idx="minor">
+            <a:schemeClr val="tx1"/>
+          </a:fontRef>
+        </p:style>
+      </p:cxnSp>
+      <mc:AlternateContent xmlns:mc="http://schemas.openxmlformats.org/markup-compatibility/2006">
+        <mc:Choice xmlns:a14="http://schemas.microsoft.com/office/drawing/2010/main" Requires="a14">
+          <p:sp>
+            <p:nvSpPr>
+              <p:cNvPr id="28" name="矩形: 圆角 27">
+                <a:extLst>
+                  <a:ext uri="{FF2B5EF4-FFF2-40B4-BE49-F238E27FC236}">
+                    <a16:creationId xmlns:a16="http://schemas.microsoft.com/office/drawing/2014/main" id="{41DA543C-17D7-4D76-BCAE-5797090498C1}"/>
+                  </a:ext>
+                </a:extLst>
+              </p:cNvPr>
+              <p:cNvSpPr/>
+              <p:nvPr/>
+            </p:nvSpPr>
+            <p:spPr>
+              <a:xfrm>
+                <a:off x="2083637" y="4478582"/>
+                <a:ext cx="982410" cy="283807"/>
+              </a:xfrm>
+              <a:prstGeom prst="roundRect">
+                <a:avLst>
+                  <a:gd name="adj" fmla="val 50000"/>
+                </a:avLst>
+              </a:prstGeom>
+              <a:ln w="9525">
+                <a:solidFill>
+                  <a:schemeClr val="tx1"/>
+                </a:solidFill>
+                <a:headEnd type="none" w="med" len="med"/>
+                <a:tailEnd type="triangle" w="med" len="med"/>
+              </a:ln>
+              <a:effectLst>
+                <a:outerShdw blurRad="50800" dist="38100" dir="2700000" algn="tl" rotWithShape="0">
+                  <a:prstClr val="black">
+                    <a:alpha val="40000"/>
+                  </a:prstClr>
+                </a:outerShdw>
+              </a:effectLst>
+            </p:spPr>
+            <p:style>
+              <a:lnRef idx="2">
+                <a:schemeClr val="dk1"/>
+              </a:lnRef>
+              <a:fillRef idx="1">
+                <a:schemeClr val="lt1"/>
+              </a:fillRef>
+              <a:effectRef idx="0">
+                <a:schemeClr val="dk1"/>
+              </a:effectRef>
+              <a:fontRef idx="minor">
+                <a:schemeClr val="dk1"/>
+              </a:fontRef>
+            </p:style>
+            <p:txBody>
+              <a:bodyPr rtlCol="0" anchor="ctr"/>
+              <a:lstStyle/>
+              <a:p>
+                <a:pPr algn="ctr"/>
+                <a14:m>
+                  <m:oMath xmlns:m="http://schemas.openxmlformats.org/officeDocument/2006/math">
+                    <m:sSub>
+                      <m:sSubPr>
+                        <m:ctrlPr>
+                          <a:rPr lang="en-US" altLang="zh-CN" sz="1100" i="1" dirty="0" smtClean="0">
+                            <a:latin typeface="Cambria Math" panose="02040503050406030204" pitchFamily="18" charset="0"/>
+                          </a:rPr>
+                        </m:ctrlPr>
+                      </m:sSubPr>
+                      <m:e>
+                        <m:r>
+                          <a:rPr lang="en-US" altLang="zh-CN" sz="1100" i="1" dirty="0" smtClean="0">
+                            <a:latin typeface="Cambria Math" panose="02040503050406030204" pitchFamily="18" charset="0"/>
+                          </a:rPr>
+                          <m:t>𝑤</m:t>
+                        </m:r>
+                      </m:e>
+                      <m:sub>
+                        <m:r>
+                          <a:rPr lang="en-US" altLang="zh-CN" sz="1100" i="1" dirty="0" smtClean="0">
+                            <a:latin typeface="Cambria Math" panose="02040503050406030204" pitchFamily="18" charset="0"/>
+                          </a:rPr>
+                          <m:t>1</m:t>
+                        </m:r>
+                      </m:sub>
+                    </m:sSub>
+                  </m:oMath>
+                </a14:m>
+                <a:r>
+                  <a:rPr lang="en-US" altLang="zh-CN" sz="1100" dirty="0"/>
+                  <a:t> </a:t>
+                </a:r>
+                <a14:m>
+                  <m:oMath xmlns:m="http://schemas.openxmlformats.org/officeDocument/2006/math">
+                    <m:sSub>
+                      <m:sSubPr>
+                        <m:ctrlPr>
+                          <a:rPr lang="en-US" altLang="zh-CN" sz="1100" i="1" dirty="0">
+                            <a:latin typeface="Cambria Math" panose="02040503050406030204" pitchFamily="18" charset="0"/>
+                          </a:rPr>
+                        </m:ctrlPr>
+                      </m:sSubPr>
+                      <m:e>
+                        <m:r>
+                          <a:rPr lang="en-US" altLang="zh-CN" sz="1100" i="1" dirty="0" smtClean="0">
+                            <a:latin typeface="Cambria Math" panose="02040503050406030204" pitchFamily="18" charset="0"/>
+                          </a:rPr>
+                          <m:t>𝑤</m:t>
+                        </m:r>
+                      </m:e>
+                      <m:sub>
+                        <m:r>
+                          <a:rPr lang="en-US" altLang="zh-CN" sz="1100" i="1" dirty="0" smtClean="0">
+                            <a:latin typeface="Cambria Math" panose="02040503050406030204" pitchFamily="18" charset="0"/>
+                          </a:rPr>
+                          <m:t>2</m:t>
+                        </m:r>
+                      </m:sub>
+                    </m:sSub>
+                  </m:oMath>
+                </a14:m>
+                <a:r>
+                  <a:rPr lang="en-US" altLang="zh-CN" sz="1100" dirty="0"/>
+                  <a:t> … </a:t>
+                </a:r>
+                <a14:m>
+                  <m:oMath xmlns:m="http://schemas.openxmlformats.org/officeDocument/2006/math">
+                    <m:sSub>
+                      <m:sSubPr>
+                        <m:ctrlPr>
+                          <a:rPr lang="en-US" altLang="zh-CN" sz="1100" i="1" dirty="0">
+                            <a:latin typeface="Cambria Math" panose="02040503050406030204" pitchFamily="18" charset="0"/>
+                          </a:rPr>
+                        </m:ctrlPr>
+                      </m:sSubPr>
+                      <m:e>
+                        <m:r>
+                          <a:rPr lang="en-US" altLang="zh-CN" sz="1100" i="1" dirty="0" smtClean="0">
+                            <a:latin typeface="Cambria Math" panose="02040503050406030204" pitchFamily="18" charset="0"/>
+                          </a:rPr>
+                          <m:t>𝑤</m:t>
+                        </m:r>
+                      </m:e>
+                      <m:sub>
+                        <m:r>
+                          <a:rPr lang="en-US" altLang="zh-CN" sz="1100" i="1" dirty="0" smtClean="0">
+                            <a:latin typeface="Cambria Math" panose="02040503050406030204" pitchFamily="18" charset="0"/>
+                          </a:rPr>
+                          <m:t>𝑛</m:t>
+                        </m:r>
+                      </m:sub>
+                    </m:sSub>
+                  </m:oMath>
+                </a14:m>
+                <a:endParaRPr lang="zh-CN" altLang="en-US" sz="1100" dirty="0"/>
+              </a:p>
+            </p:txBody>
+          </p:sp>
+        </mc:Choice>
+        <mc:Fallback>
+          <p:sp>
+            <p:nvSpPr>
+              <p:cNvPr id="28" name="矩形: 圆角 27">
+                <a:extLst>
+                  <a:ext uri="{FF2B5EF4-FFF2-40B4-BE49-F238E27FC236}">
+                    <a16:creationId xmlns:a16="http://schemas.microsoft.com/office/drawing/2014/main" id="{41DA543C-17D7-4D76-BCAE-5797090498C1}"/>
+                  </a:ext>
+                </a:extLst>
+              </p:cNvPr>
+              <p:cNvSpPr>
+                <a:spLocks noRot="1" noChangeAspect="1" noMove="1" noResize="1" noEditPoints="1" noAdjustHandles="1" noChangeArrowheads="1" noChangeShapeType="1" noTextEdit="1"/>
+              </p:cNvSpPr>
+              <p:nvPr/>
+            </p:nvSpPr>
+            <p:spPr>
+              <a:xfrm>
+                <a:off x="2083637" y="4478582"/>
+                <a:ext cx="982410" cy="283807"/>
+              </a:xfrm>
+              <a:prstGeom prst="roundRect">
+                <a:avLst>
+                  <a:gd name="adj" fmla="val 50000"/>
+                </a:avLst>
+              </a:prstGeom>
+              <a:blipFill>
+                <a:blip r:embed="rId3"/>
+                <a:stretch>
+                  <a:fillRect/>
+                </a:stretch>
+              </a:blipFill>
+              <a:ln w="9525">
+                <a:solidFill>
+                  <a:schemeClr val="tx1"/>
+                </a:solidFill>
+                <a:headEnd type="none" w="med" len="med"/>
+                <a:tailEnd type="triangle" w="med" len="med"/>
+              </a:ln>
+              <a:effectLst>
+                <a:outerShdw blurRad="50800" dist="38100" dir="2700000" algn="tl" rotWithShape="0">
+                  <a:prstClr val="black">
+                    <a:alpha val="40000"/>
+                  </a:prstClr>
+                </a:outerShdw>
+              </a:effectLst>
+            </p:spPr>
+            <p:txBody>
+              <a:bodyPr/>
+              <a:lstStyle/>
+              <a:p>
+                <a:r>
+                  <a:rPr lang="zh-CN" altLang="en-US">
+                    <a:noFill/>
+                  </a:rPr>
+                  <a:t> </a:t>
+                </a:r>
+              </a:p>
+            </p:txBody>
+          </p:sp>
+        </mc:Fallback>
+      </mc:AlternateContent>
+      <p:sp>
+        <p:nvSpPr>
+          <p:cNvPr id="29" name="矩形: 圆角 28">
+            <a:extLst>
+              <a:ext uri="{FF2B5EF4-FFF2-40B4-BE49-F238E27FC236}">
+                <a16:creationId xmlns:a16="http://schemas.microsoft.com/office/drawing/2014/main" id="{A37BF47F-EDF7-4EEE-A865-A67C6736E30A}"/>
+              </a:ext>
+            </a:extLst>
+          </p:cNvPr>
+          <p:cNvSpPr/>
+          <p:nvPr/>
+        </p:nvSpPr>
+        <p:spPr>
+          <a:xfrm>
+            <a:off x="3307833" y="3998539"/>
+            <a:ext cx="982402" cy="283808"/>
+          </a:xfrm>
+          <a:prstGeom prst="roundRect">
+            <a:avLst>
+              <a:gd name="adj" fmla="val 50000"/>
+            </a:avLst>
+          </a:prstGeom>
+          <a:ln w="9525">
+            <a:solidFill>
+              <a:schemeClr val="tx1"/>
+            </a:solidFill>
+            <a:headEnd type="none" w="med" len="med"/>
+            <a:tailEnd type="triangle" w="med" len="med"/>
+          </a:ln>
+          <a:effectLst>
+            <a:outerShdw blurRad="50800" dist="38100" dir="2700000" algn="tl" rotWithShape="0">
+              <a:prstClr val="black">
+                <a:alpha val="40000"/>
+              </a:prstClr>
+            </a:outerShdw>
+          </a:effectLst>
+        </p:spPr>
+        <p:style>
+          <a:lnRef idx="2">
+            <a:schemeClr val="dk1"/>
+          </a:lnRef>
+          <a:fillRef idx="1">
+            <a:schemeClr val="lt1"/>
+          </a:fillRef>
+          <a:effectRef idx="0">
+            <a:schemeClr val="dk1"/>
+          </a:effectRef>
+          <a:fontRef idx="minor">
+            <a:schemeClr val="dk1"/>
+          </a:fontRef>
+        </p:style>
+        <p:txBody>
+          <a:bodyPr rtlCol="0" anchor="ctr"/>
+          <a:lstStyle/>
+          <a:p>
+            <a:pPr algn="ctr"/>
+            <a:r>
+              <a:rPr lang="en-US" altLang="zh-CN" sz="1100" dirty="0">
+                <a:latin typeface="Consolas" panose="020B0609020204030204" pitchFamily="49" charset="0"/>
+              </a:rPr>
+              <a:t>Position</a:t>
+            </a:r>
+            <a:endParaRPr lang="zh-CN" altLang="en-US" sz="1100" dirty="0">
+              <a:latin typeface="Consolas" panose="020B0609020204030204" pitchFamily="49" charset="0"/>
+            </a:endParaRPr>
+          </a:p>
+        </p:txBody>
+      </p:sp>
+      <p:sp>
+        <p:nvSpPr>
+          <p:cNvPr id="30" name="矩形: 圆角 29">
+            <a:extLst>
+              <a:ext uri="{FF2B5EF4-FFF2-40B4-BE49-F238E27FC236}">
+                <a16:creationId xmlns:a16="http://schemas.microsoft.com/office/drawing/2014/main" id="{C0AB5226-D36B-4300-BB93-3A96F314B469}"/>
+              </a:ext>
+            </a:extLst>
+          </p:cNvPr>
+          <p:cNvSpPr/>
+          <p:nvPr/>
+        </p:nvSpPr>
+        <p:spPr>
+          <a:xfrm>
+            <a:off x="2083636" y="2957920"/>
+            <a:ext cx="2206591" cy="283808"/>
+          </a:xfrm>
+          <a:prstGeom prst="roundRect">
+            <a:avLst>
+              <a:gd name="adj" fmla="val 50000"/>
+            </a:avLst>
+          </a:prstGeom>
+          <a:ln w="9525">
+            <a:solidFill>
+              <a:schemeClr val="tx1"/>
+            </a:solidFill>
+            <a:headEnd type="none" w="med" len="med"/>
+            <a:tailEnd type="triangle" w="med" len="med"/>
+          </a:ln>
+          <a:effectLst>
+            <a:outerShdw blurRad="50800" dist="38100" dir="2700000" algn="tl" rotWithShape="0">
+              <a:prstClr val="black">
+                <a:alpha val="40000"/>
+              </a:prstClr>
+            </a:outerShdw>
+          </a:effectLst>
+        </p:spPr>
+        <p:style>
+          <a:lnRef idx="2">
+            <a:schemeClr val="dk1"/>
+          </a:lnRef>
+          <a:fillRef idx="1">
+            <a:schemeClr val="lt1"/>
+          </a:fillRef>
+          <a:effectRef idx="0">
+            <a:schemeClr val="dk1"/>
+          </a:effectRef>
+          <a:fontRef idx="minor">
+            <a:schemeClr val="dk1"/>
+          </a:fontRef>
+        </p:style>
+        <p:txBody>
+          <a:bodyPr rtlCol="0" anchor="ctr"/>
+          <a:lstStyle/>
+          <a:p>
+            <a:pPr algn="ctr"/>
+            <a:r>
+              <a:rPr lang="en-US" altLang="zh-CN" sz="1100" dirty="0">
+                <a:latin typeface="Consolas" panose="020B0609020204030204" pitchFamily="49" charset="0"/>
+              </a:rPr>
+              <a:t>Dropout</a:t>
+            </a:r>
+            <a:endParaRPr lang="zh-CN" altLang="en-US" sz="1100" dirty="0">
+              <a:latin typeface="Consolas" panose="020B0609020204030204" pitchFamily="49" charset="0"/>
+            </a:endParaRPr>
+          </a:p>
+        </p:txBody>
+      </p:sp>
+      <p:cxnSp>
+        <p:nvCxnSpPr>
+          <p:cNvPr id="31" name="直接箭头连接符 30">
+            <a:extLst>
+              <a:ext uri="{FF2B5EF4-FFF2-40B4-BE49-F238E27FC236}">
+                <a16:creationId xmlns:a16="http://schemas.microsoft.com/office/drawing/2014/main" id="{D62DD659-CB82-48C6-AC40-E15E8FEB7A2F}"/>
+              </a:ext>
+            </a:extLst>
+          </p:cNvPr>
+          <p:cNvCxnSpPr>
+            <a:cxnSpLocks/>
+          </p:cNvCxnSpPr>
+          <p:nvPr/>
+        </p:nvCxnSpPr>
+        <p:spPr>
+          <a:xfrm flipV="1">
+            <a:off x="2575812" y="3817730"/>
+            <a:ext cx="0" cy="180809"/>
+          </a:xfrm>
+          <a:prstGeom prst="straightConnector1">
+            <a:avLst/>
+          </a:prstGeom>
+          <a:ln>
+            <a:solidFill>
+              <a:schemeClr val="tx1"/>
+            </a:solidFill>
+            <a:headEnd type="none" w="med" len="med"/>
+            <a:tailEnd type="triangle" w="med" len="med"/>
+          </a:ln>
+          <a:effectLst>
+            <a:outerShdw blurRad="50800" dist="38100" dir="2700000" algn="tl" rotWithShape="0">
+              <a:prstClr val="black">
+                <a:alpha val="40000"/>
+              </a:prstClr>
+            </a:outerShdw>
+          </a:effectLst>
+        </p:spPr>
+        <p:style>
+          <a:lnRef idx="1">
+            <a:schemeClr val="accent1"/>
+          </a:lnRef>
+          <a:fillRef idx="0">
+            <a:schemeClr val="accent1"/>
+          </a:fillRef>
+          <a:effectRef idx="0">
+            <a:schemeClr val="accent1"/>
+          </a:effectRef>
+          <a:fontRef idx="minor">
+            <a:schemeClr val="tx1"/>
+          </a:fontRef>
+        </p:style>
+      </p:cxnSp>
+      <p:sp>
+        <p:nvSpPr>
+          <p:cNvPr id="32" name="矩形: 圆角 31">
+            <a:extLst>
+              <a:ext uri="{FF2B5EF4-FFF2-40B4-BE49-F238E27FC236}">
+                <a16:creationId xmlns:a16="http://schemas.microsoft.com/office/drawing/2014/main" id="{E92E8131-F75E-4BFE-A184-6047DD652F2F}"/>
+              </a:ext>
+            </a:extLst>
+          </p:cNvPr>
+          <p:cNvSpPr/>
+          <p:nvPr/>
+        </p:nvSpPr>
+        <p:spPr>
+          <a:xfrm>
+            <a:off x="2083636" y="2317249"/>
+            <a:ext cx="2206591" cy="283808"/>
+          </a:xfrm>
+          <a:prstGeom prst="roundRect">
+            <a:avLst>
+              <a:gd name="adj" fmla="val 50000"/>
+            </a:avLst>
+          </a:prstGeom>
+          <a:ln w="9525">
+            <a:solidFill>
+              <a:schemeClr val="tx1"/>
+            </a:solidFill>
+            <a:headEnd type="none" w="med" len="med"/>
+            <a:tailEnd type="triangle" w="med" len="med"/>
+          </a:ln>
+          <a:effectLst>
+            <a:outerShdw blurRad="50800" dist="38100" dir="2700000" algn="tl" rotWithShape="0">
+              <a:prstClr val="black">
+                <a:alpha val="40000"/>
+              </a:prstClr>
+            </a:outerShdw>
+          </a:effectLst>
+        </p:spPr>
+        <p:style>
+          <a:lnRef idx="2">
+            <a:schemeClr val="dk1"/>
+          </a:lnRef>
+          <a:fillRef idx="1">
+            <a:schemeClr val="lt1"/>
+          </a:fillRef>
+          <a:effectRef idx="0">
+            <a:schemeClr val="dk1"/>
+          </a:effectRef>
+          <a:fontRef idx="minor">
+            <a:schemeClr val="dk1"/>
+          </a:fontRef>
+        </p:style>
+        <p:txBody>
+          <a:bodyPr rtlCol="0" anchor="ctr"/>
+          <a:lstStyle/>
+          <a:p>
+            <a:pPr algn="ctr"/>
+            <a:r>
+              <a:rPr lang="en-US" altLang="zh-CN" sz="1100" dirty="0">
+                <a:latin typeface="Consolas" panose="020B0609020204030204" pitchFamily="49" charset="0"/>
+              </a:rPr>
+              <a:t>Multi-</a:t>
+            </a:r>
+            <a:r>
+              <a:rPr lang="en-US" altLang="zh-CN" sz="1100" dirty="0" err="1">
+                <a:latin typeface="Consolas" panose="020B0609020204030204" pitchFamily="49" charset="0"/>
+              </a:rPr>
+              <a:t>SelfAttention</a:t>
+            </a:r>
+            <a:r>
+              <a:rPr lang="en-US" altLang="zh-CN" sz="1100" dirty="0">
+                <a:latin typeface="Consolas" panose="020B0609020204030204" pitchFamily="49" charset="0"/>
+              </a:rPr>
+              <a:t> &amp; Dropout</a:t>
+            </a:r>
+            <a:endParaRPr lang="zh-CN" altLang="en-US" sz="1100" dirty="0">
+              <a:latin typeface="Consolas" panose="020B0609020204030204" pitchFamily="49" charset="0"/>
+            </a:endParaRPr>
+          </a:p>
+        </p:txBody>
+      </p:sp>
+      <p:cxnSp>
+        <p:nvCxnSpPr>
+          <p:cNvPr id="33" name="直接箭头连接符 32">
+            <a:extLst>
+              <a:ext uri="{FF2B5EF4-FFF2-40B4-BE49-F238E27FC236}">
+                <a16:creationId xmlns:a16="http://schemas.microsoft.com/office/drawing/2014/main" id="{5CB47D06-8836-4912-A1FC-579C8EA3E7EE}"/>
+              </a:ext>
+            </a:extLst>
+          </p:cNvPr>
+          <p:cNvCxnSpPr>
+            <a:cxnSpLocks/>
+            <a:stCxn id="30" idx="0"/>
+            <a:endCxn id="32" idx="2"/>
+          </p:cNvCxnSpPr>
+          <p:nvPr/>
+        </p:nvCxnSpPr>
+        <p:spPr>
+          <a:xfrm flipV="1">
+            <a:off x="3186932" y="2601057"/>
+            <a:ext cx="0" cy="356863"/>
+          </a:xfrm>
+          <a:prstGeom prst="straightConnector1">
+            <a:avLst/>
+          </a:prstGeom>
+          <a:ln>
+            <a:solidFill>
+              <a:schemeClr val="tx1"/>
+            </a:solidFill>
+            <a:headEnd type="none" w="med" len="med"/>
+            <a:tailEnd type="triangle" w="med" len="med"/>
+          </a:ln>
+          <a:effectLst>
+            <a:outerShdw blurRad="50800" dist="38100" dir="2700000" algn="tl" rotWithShape="0">
+              <a:prstClr val="black">
+                <a:alpha val="40000"/>
+              </a:prstClr>
+            </a:outerShdw>
+          </a:effectLst>
+        </p:spPr>
+        <p:style>
+          <a:lnRef idx="1">
+            <a:schemeClr val="accent1"/>
+          </a:lnRef>
+          <a:fillRef idx="0">
+            <a:schemeClr val="accent1"/>
+          </a:fillRef>
+          <a:effectRef idx="0">
+            <a:schemeClr val="accent1"/>
+          </a:effectRef>
+          <a:fontRef idx="minor">
+            <a:schemeClr val="tx1"/>
+          </a:fontRef>
+        </p:style>
+      </p:cxnSp>
+      <p:sp>
+        <p:nvSpPr>
+          <p:cNvPr id="34" name="矩形: 圆角 33">
+            <a:extLst>
+              <a:ext uri="{FF2B5EF4-FFF2-40B4-BE49-F238E27FC236}">
+                <a16:creationId xmlns:a16="http://schemas.microsoft.com/office/drawing/2014/main" id="{F719D1CD-6772-4DE0-A1BB-21B0B6A9CD7E}"/>
+              </a:ext>
+            </a:extLst>
+          </p:cNvPr>
+          <p:cNvSpPr/>
+          <p:nvPr/>
+        </p:nvSpPr>
+        <p:spPr>
+          <a:xfrm>
+            <a:off x="2083636" y="1822678"/>
+            <a:ext cx="2206591" cy="283808"/>
+          </a:xfrm>
+          <a:prstGeom prst="roundRect">
+            <a:avLst>
+              <a:gd name="adj" fmla="val 50000"/>
+            </a:avLst>
+          </a:prstGeom>
+          <a:ln w="9525">
+            <a:solidFill>
+              <a:schemeClr val="tx1"/>
+            </a:solidFill>
+            <a:headEnd type="none" w="med" len="med"/>
+            <a:tailEnd type="triangle" w="med" len="med"/>
+          </a:ln>
+          <a:effectLst>
+            <a:outerShdw blurRad="50800" dist="38100" dir="2700000" algn="tl" rotWithShape="0">
+              <a:prstClr val="black">
+                <a:alpha val="40000"/>
+              </a:prstClr>
+            </a:outerShdw>
+          </a:effectLst>
+        </p:spPr>
+        <p:style>
+          <a:lnRef idx="2">
+            <a:schemeClr val="dk1"/>
+          </a:lnRef>
+          <a:fillRef idx="1">
+            <a:schemeClr val="lt1"/>
+          </a:fillRef>
+          <a:effectRef idx="0">
+            <a:schemeClr val="dk1"/>
+          </a:effectRef>
+          <a:fontRef idx="minor">
+            <a:schemeClr val="dk1"/>
+          </a:fontRef>
+        </p:style>
+        <p:txBody>
+          <a:bodyPr rtlCol="0" anchor="ctr"/>
+          <a:lstStyle/>
+          <a:p>
+            <a:pPr algn="ctr"/>
+            <a:r>
+              <a:rPr lang="en-US" altLang="zh-CN" sz="1100" dirty="0">
+                <a:latin typeface="Consolas" panose="020B0609020204030204" pitchFamily="49" charset="0"/>
+              </a:rPr>
+              <a:t>Add &amp; Norm</a:t>
+            </a:r>
+            <a:endParaRPr lang="zh-CN" altLang="en-US" sz="1100" dirty="0">
+              <a:latin typeface="Consolas" panose="020B0609020204030204" pitchFamily="49" charset="0"/>
+            </a:endParaRPr>
+          </a:p>
+        </p:txBody>
+      </p:sp>
+      <p:grpSp>
+        <p:nvGrpSpPr>
+          <p:cNvPr id="23" name="组合 22">
+            <a:extLst>
+              <a:ext uri="{FF2B5EF4-FFF2-40B4-BE49-F238E27FC236}">
+                <a16:creationId xmlns:a16="http://schemas.microsoft.com/office/drawing/2014/main" id="{D5356ED8-1DE2-4328-8450-3924F993BF31}"/>
+              </a:ext>
+            </a:extLst>
+          </p:cNvPr>
+          <p:cNvGrpSpPr/>
+          <p:nvPr/>
+        </p:nvGrpSpPr>
+        <p:grpSpPr>
+          <a:xfrm>
+            <a:off x="1605205" y="1950946"/>
+            <a:ext cx="1558683" cy="839574"/>
+            <a:chOff x="4377128" y="1821305"/>
+            <a:chExt cx="751883" cy="517161"/>
+          </a:xfrm>
+        </p:grpSpPr>
+        <p:cxnSp>
+          <p:nvCxnSpPr>
+            <p:cNvPr id="18" name="直接连接符 17">
+              <a:extLst>
+                <a:ext uri="{FF2B5EF4-FFF2-40B4-BE49-F238E27FC236}">
+                  <a16:creationId xmlns:a16="http://schemas.microsoft.com/office/drawing/2014/main" id="{E0DDB0C6-8B38-44DC-9D60-98CD7A3630D1}"/>
+                </a:ext>
+              </a:extLst>
+            </p:cNvPr>
+            <p:cNvCxnSpPr>
+              <a:cxnSpLocks/>
+            </p:cNvCxnSpPr>
+            <p:nvPr/>
+          </p:nvCxnSpPr>
+          <p:spPr>
+            <a:xfrm flipH="1">
+              <a:off x="4377128" y="2323847"/>
+              <a:ext cx="751883" cy="0"/>
+            </a:xfrm>
+            <a:prstGeom prst="line">
+              <a:avLst/>
+            </a:prstGeom>
+          </p:spPr>
+          <p:style>
+            <a:lnRef idx="1">
+              <a:schemeClr val="dk1"/>
+            </a:lnRef>
+            <a:fillRef idx="0">
+              <a:schemeClr val="dk1"/>
+            </a:fillRef>
+            <a:effectRef idx="0">
+              <a:schemeClr val="dk1"/>
+            </a:effectRef>
+            <a:fontRef idx="minor">
+              <a:schemeClr val="tx1"/>
+            </a:fontRef>
+          </p:style>
+        </p:cxnSp>
+        <p:cxnSp>
+          <p:nvCxnSpPr>
+            <p:cNvPr id="20" name="直接连接符 19">
+              <a:extLst>
+                <a:ext uri="{FF2B5EF4-FFF2-40B4-BE49-F238E27FC236}">
+                  <a16:creationId xmlns:a16="http://schemas.microsoft.com/office/drawing/2014/main" id="{2B159477-AADD-4797-98B7-CBAD116274DD}"/>
+                </a:ext>
+              </a:extLst>
+            </p:cNvPr>
+            <p:cNvCxnSpPr/>
+            <p:nvPr/>
+          </p:nvCxnSpPr>
+          <p:spPr>
+            <a:xfrm flipV="1">
+              <a:off x="4377128" y="1821305"/>
+              <a:ext cx="0" cy="517161"/>
+            </a:xfrm>
+            <a:prstGeom prst="line">
+              <a:avLst/>
+            </a:prstGeom>
+          </p:spPr>
+          <p:style>
+            <a:lnRef idx="1">
+              <a:schemeClr val="dk1"/>
+            </a:lnRef>
+            <a:fillRef idx="0">
+              <a:schemeClr val="dk1"/>
+            </a:fillRef>
+            <a:effectRef idx="0">
+              <a:schemeClr val="dk1"/>
+            </a:effectRef>
+            <a:fontRef idx="minor">
+              <a:schemeClr val="tx1"/>
+            </a:fontRef>
+          </p:style>
+        </p:cxnSp>
+        <p:cxnSp>
+          <p:nvCxnSpPr>
+            <p:cNvPr id="22" name="直接箭头连接符 21">
+              <a:extLst>
+                <a:ext uri="{FF2B5EF4-FFF2-40B4-BE49-F238E27FC236}">
+                  <a16:creationId xmlns:a16="http://schemas.microsoft.com/office/drawing/2014/main" id="{AAB3A19E-976A-4F10-91B6-2B9EB3DF5000}"/>
+                </a:ext>
+              </a:extLst>
+            </p:cNvPr>
+            <p:cNvCxnSpPr>
+              <a:cxnSpLocks/>
+            </p:cNvCxnSpPr>
+            <p:nvPr/>
+          </p:nvCxnSpPr>
+          <p:spPr>
+            <a:xfrm>
+              <a:off x="4377128" y="1821305"/>
+              <a:ext cx="205477" cy="0"/>
+            </a:xfrm>
+            <a:prstGeom prst="straightConnector1">
+              <a:avLst/>
+            </a:prstGeom>
+            <a:ln>
+              <a:tailEnd type="triangle"/>
+            </a:ln>
+          </p:spPr>
+          <p:style>
+            <a:lnRef idx="1">
+              <a:schemeClr val="dk1"/>
+            </a:lnRef>
+            <a:fillRef idx="0">
+              <a:schemeClr val="dk1"/>
+            </a:fillRef>
+            <a:effectRef idx="0">
+              <a:schemeClr val="dk1"/>
+            </a:effectRef>
+            <a:fontRef idx="minor">
+              <a:schemeClr val="tx1"/>
+            </a:fontRef>
+          </p:style>
+        </p:cxnSp>
+      </p:grpSp>
+      <p:cxnSp>
+        <p:nvCxnSpPr>
+          <p:cNvPr id="62" name="直接箭头连接符 61">
+            <a:extLst>
+              <a:ext uri="{FF2B5EF4-FFF2-40B4-BE49-F238E27FC236}">
+                <a16:creationId xmlns:a16="http://schemas.microsoft.com/office/drawing/2014/main" id="{5F719377-113C-4215-AC35-5A88A561E56C}"/>
+              </a:ext>
+            </a:extLst>
+          </p:cNvPr>
+          <p:cNvCxnSpPr>
+            <a:cxnSpLocks/>
+          </p:cNvCxnSpPr>
+          <p:nvPr/>
+        </p:nvCxnSpPr>
+        <p:spPr>
+          <a:xfrm flipV="1">
+            <a:off x="3165416" y="1626443"/>
+            <a:ext cx="0" cy="180809"/>
+          </a:xfrm>
+          <a:prstGeom prst="straightConnector1">
+            <a:avLst/>
+          </a:prstGeom>
+          <a:ln>
+            <a:solidFill>
+              <a:schemeClr val="tx1"/>
+            </a:solidFill>
+            <a:headEnd type="none" w="med" len="med"/>
+            <a:tailEnd type="triangle" w="med" len="med"/>
+          </a:ln>
+          <a:effectLst>
+            <a:outerShdw blurRad="50800" dist="38100" dir="2700000" algn="tl" rotWithShape="0">
+              <a:prstClr val="black">
+                <a:alpha val="40000"/>
+              </a:prstClr>
+            </a:outerShdw>
+          </a:effectLst>
+        </p:spPr>
+        <p:style>
+          <a:lnRef idx="1">
+            <a:schemeClr val="accent1"/>
+          </a:lnRef>
+          <a:fillRef idx="0">
+            <a:schemeClr val="accent1"/>
+          </a:fillRef>
+          <a:effectRef idx="0">
+            <a:schemeClr val="accent1"/>
+          </a:effectRef>
+          <a:fontRef idx="minor">
+            <a:schemeClr val="tx1"/>
+          </a:fontRef>
+        </p:style>
+      </p:cxnSp>
+      <p:cxnSp>
+        <p:nvCxnSpPr>
+          <p:cNvPr id="63" name="直接箭头连接符 62">
+            <a:extLst>
+              <a:ext uri="{FF2B5EF4-FFF2-40B4-BE49-F238E27FC236}">
+                <a16:creationId xmlns:a16="http://schemas.microsoft.com/office/drawing/2014/main" id="{47B28FF7-8D92-48CF-87C4-52FB321FDC49}"/>
+              </a:ext>
+            </a:extLst>
+          </p:cNvPr>
+          <p:cNvCxnSpPr>
+            <a:cxnSpLocks/>
+            <a:stCxn id="32" idx="0"/>
+            <a:endCxn id="34" idx="2"/>
+          </p:cNvCxnSpPr>
+          <p:nvPr/>
+        </p:nvCxnSpPr>
+        <p:spPr>
+          <a:xfrm flipV="1">
+            <a:off x="3186932" y="2106486"/>
+            <a:ext cx="0" cy="210763"/>
+          </a:xfrm>
+          <a:prstGeom prst="straightConnector1">
+            <a:avLst/>
+          </a:prstGeom>
+          <a:ln>
+            <a:solidFill>
+              <a:schemeClr val="tx1"/>
+            </a:solidFill>
+            <a:headEnd type="none" w="med" len="med"/>
+            <a:tailEnd type="triangle" w="med" len="med"/>
+          </a:ln>
+          <a:effectLst>
+            <a:outerShdw blurRad="50800" dist="38100" dir="2700000" algn="tl" rotWithShape="0">
+              <a:prstClr val="black">
+                <a:alpha val="40000"/>
+              </a:prstClr>
+            </a:outerShdw>
+          </a:effectLst>
+        </p:spPr>
+        <p:style>
+          <a:lnRef idx="1">
+            <a:schemeClr val="accent1"/>
+          </a:lnRef>
+          <a:fillRef idx="0">
+            <a:schemeClr val="accent1"/>
+          </a:fillRef>
+          <a:effectRef idx="0">
+            <a:schemeClr val="accent1"/>
+          </a:effectRef>
+          <a:fontRef idx="minor">
+            <a:schemeClr val="tx1"/>
+          </a:fontRef>
+        </p:style>
+      </p:cxnSp>
+      <p:sp>
+        <p:nvSpPr>
+          <p:cNvPr id="68" name="矩形: 圆角 67">
+            <a:extLst>
+              <a:ext uri="{FF2B5EF4-FFF2-40B4-BE49-F238E27FC236}">
+                <a16:creationId xmlns:a16="http://schemas.microsoft.com/office/drawing/2014/main" id="{165A6E76-4FA5-4BE8-A9D4-7BB978388D7D}"/>
+              </a:ext>
+            </a:extLst>
+          </p:cNvPr>
+          <p:cNvSpPr/>
+          <p:nvPr/>
+        </p:nvSpPr>
+        <p:spPr>
+          <a:xfrm>
+            <a:off x="2083636" y="1296119"/>
+            <a:ext cx="2206591" cy="283808"/>
+          </a:xfrm>
+          <a:prstGeom prst="roundRect">
+            <a:avLst>
+              <a:gd name="adj" fmla="val 50000"/>
+            </a:avLst>
+          </a:prstGeom>
+          <a:ln w="9525">
+            <a:solidFill>
+              <a:schemeClr val="tx1"/>
+            </a:solidFill>
+            <a:headEnd type="none" w="med" len="med"/>
+            <a:tailEnd type="triangle" w="med" len="med"/>
+          </a:ln>
+          <a:effectLst>
+            <a:outerShdw blurRad="50800" dist="38100" dir="2700000" algn="tl" rotWithShape="0">
+              <a:prstClr val="black">
+                <a:alpha val="40000"/>
+              </a:prstClr>
+            </a:outerShdw>
+          </a:effectLst>
+        </p:spPr>
+        <p:style>
+          <a:lnRef idx="2">
+            <a:schemeClr val="dk1"/>
+          </a:lnRef>
+          <a:fillRef idx="1">
+            <a:schemeClr val="lt1"/>
+          </a:fillRef>
+          <a:effectRef idx="0">
+            <a:schemeClr val="dk1"/>
+          </a:effectRef>
+          <a:fontRef idx="minor">
+            <a:schemeClr val="dk1"/>
+          </a:fontRef>
+        </p:style>
+        <p:txBody>
+          <a:bodyPr rtlCol="0" anchor="ctr"/>
+          <a:lstStyle/>
+          <a:p>
+            <a:pPr algn="ctr"/>
+            <a:r>
+              <a:rPr lang="en-US" altLang="zh-CN" sz="1100" dirty="0">
+                <a:latin typeface="Consolas" panose="020B0609020204030204" pitchFamily="49" charset="0"/>
+              </a:rPr>
+              <a:t>feed forward(</a:t>
+            </a:r>
+            <a:r>
+              <a:rPr lang="zh-CN" altLang="en-US" sz="1100" dirty="0">
+                <a:latin typeface="Consolas" panose="020B0609020204030204" pitchFamily="49" charset="0"/>
+              </a:rPr>
+              <a:t>两层全连接</a:t>
+            </a:r>
+            <a:r>
+              <a:rPr lang="en-US" altLang="zh-CN" sz="1100" dirty="0">
+                <a:latin typeface="Consolas" panose="020B0609020204030204" pitchFamily="49" charset="0"/>
+              </a:rPr>
+              <a:t>)</a:t>
+            </a:r>
+            <a:endParaRPr lang="zh-CN" altLang="en-US" sz="1100" dirty="0">
+              <a:latin typeface="Consolas" panose="020B0609020204030204" pitchFamily="49" charset="0"/>
+            </a:endParaRPr>
+          </a:p>
+        </p:txBody>
+      </p:sp>
+      <p:sp>
+        <p:nvSpPr>
+          <p:cNvPr id="69" name="矩形: 圆角 68">
+            <a:extLst>
+              <a:ext uri="{FF2B5EF4-FFF2-40B4-BE49-F238E27FC236}">
+                <a16:creationId xmlns:a16="http://schemas.microsoft.com/office/drawing/2014/main" id="{849A0DE6-9E1F-4CAE-B9BE-8D149C0F7A7F}"/>
+              </a:ext>
+            </a:extLst>
+          </p:cNvPr>
+          <p:cNvSpPr/>
+          <p:nvPr/>
+        </p:nvSpPr>
+        <p:spPr>
+          <a:xfrm>
+            <a:off x="2083636" y="774531"/>
+            <a:ext cx="2206591" cy="283808"/>
+          </a:xfrm>
+          <a:prstGeom prst="roundRect">
+            <a:avLst>
+              <a:gd name="adj" fmla="val 50000"/>
+            </a:avLst>
+          </a:prstGeom>
+          <a:ln w="9525">
+            <a:solidFill>
+              <a:schemeClr val="tx1"/>
+            </a:solidFill>
+            <a:headEnd type="none" w="med" len="med"/>
+            <a:tailEnd type="triangle" w="med" len="med"/>
+          </a:ln>
+          <a:effectLst>
+            <a:outerShdw blurRad="50800" dist="38100" dir="2700000" algn="tl" rotWithShape="0">
+              <a:prstClr val="black">
+                <a:alpha val="40000"/>
+              </a:prstClr>
+            </a:outerShdw>
+          </a:effectLst>
+        </p:spPr>
+        <p:style>
+          <a:lnRef idx="2">
+            <a:schemeClr val="dk1"/>
+          </a:lnRef>
+          <a:fillRef idx="1">
+            <a:schemeClr val="lt1"/>
+          </a:fillRef>
+          <a:effectRef idx="0">
+            <a:schemeClr val="dk1"/>
+          </a:effectRef>
+          <a:fontRef idx="minor">
+            <a:schemeClr val="dk1"/>
+          </a:fontRef>
+        </p:style>
+        <p:txBody>
+          <a:bodyPr rtlCol="0" anchor="ctr"/>
+          <a:lstStyle/>
+          <a:p>
+            <a:pPr algn="ctr"/>
+            <a:r>
+              <a:rPr lang="en-US" altLang="zh-CN" sz="1100" dirty="0">
+                <a:latin typeface="Consolas" panose="020B0609020204030204" pitchFamily="49" charset="0"/>
+              </a:rPr>
+              <a:t>Add &amp; Norm</a:t>
+            </a:r>
+            <a:endParaRPr lang="zh-CN" altLang="en-US" sz="1100" dirty="0">
+              <a:latin typeface="Consolas" panose="020B0609020204030204" pitchFamily="49" charset="0"/>
+            </a:endParaRPr>
+          </a:p>
+        </p:txBody>
+      </p:sp>
+      <p:grpSp>
+        <p:nvGrpSpPr>
+          <p:cNvPr id="70" name="组合 69">
+            <a:extLst>
+              <a:ext uri="{FF2B5EF4-FFF2-40B4-BE49-F238E27FC236}">
+                <a16:creationId xmlns:a16="http://schemas.microsoft.com/office/drawing/2014/main" id="{7B21271C-5021-4F47-A9C6-32501F04874C}"/>
+              </a:ext>
+            </a:extLst>
+          </p:cNvPr>
+          <p:cNvGrpSpPr/>
+          <p:nvPr/>
+        </p:nvGrpSpPr>
+        <p:grpSpPr>
+          <a:xfrm>
+            <a:off x="1605204" y="885480"/>
+            <a:ext cx="1558683" cy="819454"/>
+            <a:chOff x="4377128" y="1821305"/>
+            <a:chExt cx="751883" cy="517161"/>
+          </a:xfrm>
+        </p:grpSpPr>
+        <p:cxnSp>
+          <p:nvCxnSpPr>
+            <p:cNvPr id="71" name="直接连接符 70">
+              <a:extLst>
+                <a:ext uri="{FF2B5EF4-FFF2-40B4-BE49-F238E27FC236}">
+                  <a16:creationId xmlns:a16="http://schemas.microsoft.com/office/drawing/2014/main" id="{721CD81A-A130-4826-B98C-CC608517D5C4}"/>
+                </a:ext>
+              </a:extLst>
+            </p:cNvPr>
+            <p:cNvCxnSpPr>
+              <a:cxnSpLocks/>
+            </p:cNvCxnSpPr>
+            <p:nvPr/>
+          </p:nvCxnSpPr>
+          <p:spPr>
+            <a:xfrm flipH="1">
+              <a:off x="4377128" y="2323847"/>
+              <a:ext cx="751883" cy="0"/>
+            </a:xfrm>
+            <a:prstGeom prst="line">
+              <a:avLst/>
+            </a:prstGeom>
+          </p:spPr>
+          <p:style>
+            <a:lnRef idx="1">
+              <a:schemeClr val="dk1"/>
+            </a:lnRef>
+            <a:fillRef idx="0">
+              <a:schemeClr val="dk1"/>
+            </a:fillRef>
+            <a:effectRef idx="0">
+              <a:schemeClr val="dk1"/>
+            </a:effectRef>
+            <a:fontRef idx="minor">
+              <a:schemeClr val="tx1"/>
+            </a:fontRef>
+          </p:style>
+        </p:cxnSp>
+        <p:cxnSp>
+          <p:nvCxnSpPr>
+            <p:cNvPr id="72" name="直接连接符 71">
+              <a:extLst>
+                <a:ext uri="{FF2B5EF4-FFF2-40B4-BE49-F238E27FC236}">
+                  <a16:creationId xmlns:a16="http://schemas.microsoft.com/office/drawing/2014/main" id="{8F8523C5-F9B3-4C2B-892B-45CBA705FBDD}"/>
+                </a:ext>
+              </a:extLst>
+            </p:cNvPr>
+            <p:cNvCxnSpPr/>
+            <p:nvPr/>
+          </p:nvCxnSpPr>
+          <p:spPr>
+            <a:xfrm flipV="1">
+              <a:off x="4377128" y="1821305"/>
+              <a:ext cx="0" cy="517161"/>
+            </a:xfrm>
+            <a:prstGeom prst="line">
+              <a:avLst/>
+            </a:prstGeom>
+          </p:spPr>
+          <p:style>
+            <a:lnRef idx="1">
+              <a:schemeClr val="dk1"/>
+            </a:lnRef>
+            <a:fillRef idx="0">
+              <a:schemeClr val="dk1"/>
+            </a:fillRef>
+            <a:effectRef idx="0">
+              <a:schemeClr val="dk1"/>
+            </a:effectRef>
+            <a:fontRef idx="minor">
+              <a:schemeClr val="tx1"/>
+            </a:fontRef>
+          </p:style>
+        </p:cxnSp>
+        <p:cxnSp>
+          <p:nvCxnSpPr>
+            <p:cNvPr id="73" name="直接箭头连接符 72">
+              <a:extLst>
+                <a:ext uri="{FF2B5EF4-FFF2-40B4-BE49-F238E27FC236}">
+                  <a16:creationId xmlns:a16="http://schemas.microsoft.com/office/drawing/2014/main" id="{39047505-E44F-4741-B5F9-9F7F21EA020F}"/>
+                </a:ext>
+              </a:extLst>
+            </p:cNvPr>
+            <p:cNvCxnSpPr>
+              <a:cxnSpLocks/>
+            </p:cNvCxnSpPr>
+            <p:nvPr/>
+          </p:nvCxnSpPr>
+          <p:spPr>
+            <a:xfrm>
+              <a:off x="4377128" y="1821305"/>
+              <a:ext cx="205477" cy="0"/>
+            </a:xfrm>
+            <a:prstGeom prst="straightConnector1">
+              <a:avLst/>
+            </a:prstGeom>
+            <a:ln>
+              <a:tailEnd type="triangle"/>
+            </a:ln>
+          </p:spPr>
+          <p:style>
+            <a:lnRef idx="1">
+              <a:schemeClr val="dk1"/>
+            </a:lnRef>
+            <a:fillRef idx="0">
+              <a:schemeClr val="dk1"/>
+            </a:fillRef>
+            <a:effectRef idx="0">
+              <a:schemeClr val="dk1"/>
+            </a:effectRef>
+            <a:fontRef idx="minor">
+              <a:schemeClr val="tx1"/>
+            </a:fontRef>
+          </p:style>
+        </p:cxnSp>
+      </p:grpSp>
+      <p:cxnSp>
+        <p:nvCxnSpPr>
+          <p:cNvPr id="74" name="直接箭头连接符 73">
+            <a:extLst>
+              <a:ext uri="{FF2B5EF4-FFF2-40B4-BE49-F238E27FC236}">
+                <a16:creationId xmlns:a16="http://schemas.microsoft.com/office/drawing/2014/main" id="{2196392D-D953-4B79-871E-0671BE1FA921}"/>
+              </a:ext>
+            </a:extLst>
+          </p:cNvPr>
+          <p:cNvCxnSpPr>
+            <a:cxnSpLocks/>
+          </p:cNvCxnSpPr>
+          <p:nvPr/>
+        </p:nvCxnSpPr>
+        <p:spPr>
+          <a:xfrm flipV="1">
+            <a:off x="3163887" y="1104338"/>
+            <a:ext cx="0" cy="180809"/>
+          </a:xfrm>
+          <a:prstGeom prst="straightConnector1">
+            <a:avLst/>
+          </a:prstGeom>
+          <a:ln>
+            <a:solidFill>
+              <a:schemeClr val="tx1"/>
+            </a:solidFill>
+            <a:headEnd type="none" w="med" len="med"/>
+            <a:tailEnd type="triangle" w="med" len="med"/>
+          </a:ln>
+          <a:effectLst>
+            <a:outerShdw blurRad="50800" dist="38100" dir="2700000" algn="tl" rotWithShape="0">
+              <a:prstClr val="black">
+                <a:alpha val="40000"/>
+              </a:prstClr>
+            </a:outerShdw>
+          </a:effectLst>
+        </p:spPr>
+        <p:style>
+          <a:lnRef idx="1">
+            <a:schemeClr val="accent1"/>
+          </a:lnRef>
+          <a:fillRef idx="0">
+            <a:schemeClr val="accent1"/>
+          </a:fillRef>
+          <a:effectRef idx="0">
+            <a:schemeClr val="accent1"/>
+          </a:effectRef>
+          <a:fontRef idx="minor">
+            <a:schemeClr val="tx1"/>
+          </a:fontRef>
+        </p:style>
+      </p:cxnSp>
+      <p:sp>
+        <p:nvSpPr>
+          <p:cNvPr id="44" name="矩形 43">
+            <a:extLst>
+              <a:ext uri="{FF2B5EF4-FFF2-40B4-BE49-F238E27FC236}">
+                <a16:creationId xmlns:a16="http://schemas.microsoft.com/office/drawing/2014/main" id="{C927158E-F9E4-4BFF-9BE7-2860EC48A9BF}"/>
+              </a:ext>
+            </a:extLst>
+          </p:cNvPr>
+          <p:cNvSpPr/>
+          <p:nvPr/>
+        </p:nvSpPr>
+        <p:spPr>
+          <a:xfrm>
+            <a:off x="1309702" y="608676"/>
+            <a:ext cx="3569596" cy="2276764"/>
+          </a:xfrm>
+          <a:prstGeom prst="rect">
+            <a:avLst/>
+          </a:prstGeom>
+          <a:noFill/>
+        </p:spPr>
+        <p:style>
+          <a:lnRef idx="2">
+            <a:schemeClr val="accent1">
+              <a:shade val="50000"/>
+            </a:schemeClr>
+          </a:lnRef>
+          <a:fillRef idx="1">
+            <a:schemeClr val="accent1"/>
+          </a:fillRef>
+          <a:effectRef idx="0">
+            <a:schemeClr val="accent1"/>
+          </a:effectRef>
+          <a:fontRef idx="minor">
+            <a:schemeClr val="lt1"/>
+          </a:fontRef>
+        </p:style>
+        <p:txBody>
+          <a:bodyPr rtlCol="0" anchor="ctr"/>
+          <a:lstStyle/>
+          <a:p>
+            <a:pPr algn="ctr"/>
+            <a:endParaRPr lang="zh-CN" altLang="en-US"/>
+          </a:p>
+        </p:txBody>
+      </p:sp>
+      <p:sp>
+        <p:nvSpPr>
+          <p:cNvPr id="78" name="矩形: 圆角 77">
+            <a:extLst>
+              <a:ext uri="{FF2B5EF4-FFF2-40B4-BE49-F238E27FC236}">
+                <a16:creationId xmlns:a16="http://schemas.microsoft.com/office/drawing/2014/main" id="{7232011F-FACD-4094-ADBA-ECAB22A9AA78}"/>
+              </a:ext>
+            </a:extLst>
+          </p:cNvPr>
+          <p:cNvSpPr/>
+          <p:nvPr/>
+        </p:nvSpPr>
+        <p:spPr>
+          <a:xfrm>
+            <a:off x="2083636" y="3495017"/>
+            <a:ext cx="2206591" cy="283807"/>
+          </a:xfrm>
+          <a:prstGeom prst="roundRect">
+            <a:avLst>
+              <a:gd name="adj" fmla="val 50000"/>
+            </a:avLst>
+          </a:prstGeom>
+          <a:ln w="9525">
+            <a:solidFill>
+              <a:schemeClr val="tx1"/>
+            </a:solidFill>
+            <a:headEnd type="none" w="med" len="med"/>
+            <a:tailEnd type="triangle" w="med" len="med"/>
+          </a:ln>
+          <a:effectLst>
+            <a:outerShdw blurRad="50800" dist="38100" dir="2700000" algn="tl" rotWithShape="0">
+              <a:prstClr val="black">
+                <a:alpha val="40000"/>
+              </a:prstClr>
+            </a:outerShdw>
+          </a:effectLst>
+        </p:spPr>
+        <p:style>
+          <a:lnRef idx="2">
+            <a:schemeClr val="dk1"/>
+          </a:lnRef>
+          <a:fillRef idx="1">
+            <a:schemeClr val="lt1"/>
+          </a:fillRef>
+          <a:effectRef idx="0">
+            <a:schemeClr val="dk1"/>
+          </a:effectRef>
+          <a:fontRef idx="minor">
+            <a:schemeClr val="dk1"/>
+          </a:fontRef>
+        </p:style>
+        <p:txBody>
+          <a:bodyPr rtlCol="0" anchor="ctr"/>
+          <a:lstStyle/>
+          <a:p>
+            <a:pPr algn="ctr"/>
+            <a:r>
+              <a:rPr lang="en-US" altLang="zh-CN" sz="1100" dirty="0">
+                <a:latin typeface="Consolas" panose="020B0609020204030204" pitchFamily="49" charset="0"/>
+              </a:rPr>
+              <a:t>Add</a:t>
+            </a:r>
+            <a:endParaRPr lang="zh-CN" altLang="en-US" sz="1100" dirty="0">
+              <a:latin typeface="Consolas" panose="020B0609020204030204" pitchFamily="49" charset="0"/>
+            </a:endParaRPr>
+          </a:p>
+        </p:txBody>
+      </p:sp>
+      <p:cxnSp>
+        <p:nvCxnSpPr>
+          <p:cNvPr id="80" name="直接箭头连接符 79">
+            <a:extLst>
+              <a:ext uri="{FF2B5EF4-FFF2-40B4-BE49-F238E27FC236}">
+                <a16:creationId xmlns:a16="http://schemas.microsoft.com/office/drawing/2014/main" id="{6E6C2973-CC92-4D56-80FD-7FD69508A495}"/>
+              </a:ext>
+            </a:extLst>
+          </p:cNvPr>
+          <p:cNvCxnSpPr>
+            <a:cxnSpLocks/>
+          </p:cNvCxnSpPr>
+          <p:nvPr/>
+        </p:nvCxnSpPr>
+        <p:spPr>
+          <a:xfrm flipV="1">
+            <a:off x="3188454" y="3314208"/>
+            <a:ext cx="0" cy="180809"/>
+          </a:xfrm>
+          <a:prstGeom prst="straightConnector1">
+            <a:avLst/>
+          </a:prstGeom>
+          <a:ln>
+            <a:solidFill>
+              <a:schemeClr val="tx1"/>
+            </a:solidFill>
+            <a:headEnd type="none" w="med" len="med"/>
+            <a:tailEnd type="triangle" w="med" len="med"/>
+          </a:ln>
+          <a:effectLst>
+            <a:outerShdw blurRad="50800" dist="38100" dir="2700000" algn="tl" rotWithShape="0">
+              <a:prstClr val="black">
+                <a:alpha val="40000"/>
+              </a:prstClr>
+            </a:outerShdw>
+          </a:effectLst>
+        </p:spPr>
+        <p:style>
+          <a:lnRef idx="1">
+            <a:schemeClr val="accent1"/>
+          </a:lnRef>
+          <a:fillRef idx="0">
+            <a:schemeClr val="accent1"/>
+          </a:fillRef>
+          <a:effectRef idx="0">
+            <a:schemeClr val="accent1"/>
+          </a:effectRef>
+          <a:fontRef idx="minor">
+            <a:schemeClr val="tx1"/>
+          </a:fontRef>
+        </p:style>
+      </p:cxnSp>
+      <p:cxnSp>
+        <p:nvCxnSpPr>
+          <p:cNvPr id="82" name="直接箭头连接符 81">
+            <a:extLst>
+              <a:ext uri="{FF2B5EF4-FFF2-40B4-BE49-F238E27FC236}">
+                <a16:creationId xmlns:a16="http://schemas.microsoft.com/office/drawing/2014/main" id="{36CDB8F1-F291-46A3-9712-13641EEC5846}"/>
+              </a:ext>
+            </a:extLst>
+          </p:cNvPr>
+          <p:cNvCxnSpPr>
+            <a:cxnSpLocks/>
+          </p:cNvCxnSpPr>
+          <p:nvPr/>
+        </p:nvCxnSpPr>
+        <p:spPr>
+          <a:xfrm flipV="1">
+            <a:off x="3821521" y="4305827"/>
+            <a:ext cx="0" cy="180809"/>
+          </a:xfrm>
+          <a:prstGeom prst="straightConnector1">
+            <a:avLst/>
+          </a:prstGeom>
+          <a:ln>
+            <a:solidFill>
+              <a:schemeClr val="tx1"/>
+            </a:solidFill>
+            <a:headEnd type="none" w="med" len="med"/>
+            <a:tailEnd type="triangle" w="med" len="med"/>
+          </a:ln>
+          <a:effectLst>
+            <a:outerShdw blurRad="50800" dist="38100" dir="2700000" algn="tl" rotWithShape="0">
+              <a:prstClr val="black">
+                <a:alpha val="40000"/>
+              </a:prstClr>
+            </a:outerShdw>
+          </a:effectLst>
+        </p:spPr>
+        <p:style>
+          <a:lnRef idx="1">
+            <a:schemeClr val="accent1"/>
+          </a:lnRef>
+          <a:fillRef idx="0">
+            <a:schemeClr val="accent1"/>
+          </a:fillRef>
+          <a:effectRef idx="0">
+            <a:schemeClr val="accent1"/>
+          </a:effectRef>
+          <a:fontRef idx="minor">
+            <a:schemeClr val="tx1"/>
+          </a:fontRef>
+        </p:style>
+      </p:cxnSp>
+      <mc:AlternateContent xmlns:mc="http://schemas.openxmlformats.org/markup-compatibility/2006">
+        <mc:Choice xmlns:a14="http://schemas.microsoft.com/office/drawing/2010/main" Requires="a14">
+          <p:sp>
+            <p:nvSpPr>
+              <p:cNvPr id="83" name="矩形: 圆角 82">
+                <a:extLst>
+                  <a:ext uri="{FF2B5EF4-FFF2-40B4-BE49-F238E27FC236}">
+                    <a16:creationId xmlns:a16="http://schemas.microsoft.com/office/drawing/2014/main" id="{B501D2D7-1DCB-411A-86F5-920EE0DCBA34}"/>
+                  </a:ext>
+                </a:extLst>
+              </p:cNvPr>
+              <p:cNvSpPr/>
+              <p:nvPr/>
+            </p:nvSpPr>
+            <p:spPr>
+              <a:xfrm>
+                <a:off x="3330317" y="4502062"/>
+                <a:ext cx="982410" cy="283807"/>
+              </a:xfrm>
+              <a:prstGeom prst="roundRect">
+                <a:avLst>
+                  <a:gd name="adj" fmla="val 50000"/>
+                </a:avLst>
+              </a:prstGeom>
+              <a:ln w="9525">
+                <a:solidFill>
+                  <a:schemeClr val="tx1"/>
+                </a:solidFill>
+                <a:headEnd type="none" w="med" len="med"/>
+                <a:tailEnd type="triangle" w="med" len="med"/>
+              </a:ln>
+              <a:effectLst>
+                <a:outerShdw blurRad="50800" dist="38100" dir="2700000" algn="tl" rotWithShape="0">
+                  <a:prstClr val="black">
+                    <a:alpha val="40000"/>
+                  </a:prstClr>
+                </a:outerShdw>
+              </a:effectLst>
+            </p:spPr>
+            <p:style>
+              <a:lnRef idx="2">
+                <a:schemeClr val="dk1"/>
+              </a:lnRef>
+              <a:fillRef idx="1">
+                <a:schemeClr val="lt1"/>
+              </a:fillRef>
+              <a:effectRef idx="0">
+                <a:schemeClr val="dk1"/>
+              </a:effectRef>
+              <a:fontRef idx="minor">
+                <a:schemeClr val="dk1"/>
+              </a:fontRef>
+            </p:style>
+            <p:txBody>
+              <a:bodyPr rtlCol="0" anchor="ctr"/>
+              <a:lstStyle/>
+              <a:p>
+                <a:pPr algn="ctr"/>
+                <a14:m>
+                  <m:oMath xmlns:m="http://schemas.openxmlformats.org/officeDocument/2006/math">
+                    <m:sSub>
+                      <m:sSubPr>
+                        <m:ctrlPr>
+                          <a:rPr lang="en-US" altLang="zh-CN" sz="1100" i="1" dirty="0" smtClean="0">
+                            <a:latin typeface="Cambria Math" panose="02040503050406030204" pitchFamily="18" charset="0"/>
+                          </a:rPr>
+                        </m:ctrlPr>
+                      </m:sSubPr>
+                      <m:e>
+                        <m:r>
+                          <a:rPr lang="en-US" altLang="zh-CN" sz="1100" i="1" dirty="0" smtClean="0">
+                            <a:latin typeface="Cambria Math" panose="02040503050406030204" pitchFamily="18" charset="0"/>
+                          </a:rPr>
+                          <m:t>𝑤</m:t>
+                        </m:r>
+                      </m:e>
+                      <m:sub>
+                        <m:r>
+                          <a:rPr lang="en-US" altLang="zh-CN" sz="1100" i="1" dirty="0" smtClean="0">
+                            <a:latin typeface="Cambria Math" panose="02040503050406030204" pitchFamily="18" charset="0"/>
+                          </a:rPr>
+                          <m:t>1</m:t>
+                        </m:r>
+                      </m:sub>
+                    </m:sSub>
+                  </m:oMath>
+                </a14:m>
+                <a:r>
+                  <a:rPr lang="en-US" altLang="zh-CN" sz="1100" dirty="0"/>
+                  <a:t> </a:t>
+                </a:r>
+                <a14:m>
+                  <m:oMath xmlns:m="http://schemas.openxmlformats.org/officeDocument/2006/math">
+                    <m:sSub>
+                      <m:sSubPr>
+                        <m:ctrlPr>
+                          <a:rPr lang="en-US" altLang="zh-CN" sz="1100" i="1" dirty="0">
+                            <a:latin typeface="Cambria Math" panose="02040503050406030204" pitchFamily="18" charset="0"/>
+                          </a:rPr>
+                        </m:ctrlPr>
+                      </m:sSubPr>
+                      <m:e>
+                        <m:r>
+                          <a:rPr lang="en-US" altLang="zh-CN" sz="1100" i="1" dirty="0" smtClean="0">
+                            <a:latin typeface="Cambria Math" panose="02040503050406030204" pitchFamily="18" charset="0"/>
+                          </a:rPr>
+                          <m:t>𝑤</m:t>
+                        </m:r>
+                      </m:e>
+                      <m:sub>
+                        <m:r>
+                          <a:rPr lang="en-US" altLang="zh-CN" sz="1100" i="1" dirty="0" smtClean="0">
+                            <a:latin typeface="Cambria Math" panose="02040503050406030204" pitchFamily="18" charset="0"/>
+                          </a:rPr>
+                          <m:t>2</m:t>
+                        </m:r>
+                      </m:sub>
+                    </m:sSub>
+                  </m:oMath>
+                </a14:m>
+                <a:r>
+                  <a:rPr lang="en-US" altLang="zh-CN" sz="1100" dirty="0"/>
+                  <a:t> … </a:t>
+                </a:r>
+                <a14:m>
+                  <m:oMath xmlns:m="http://schemas.openxmlformats.org/officeDocument/2006/math">
+                    <m:sSub>
+                      <m:sSubPr>
+                        <m:ctrlPr>
+                          <a:rPr lang="en-US" altLang="zh-CN" sz="1100" i="1" dirty="0">
+                            <a:latin typeface="Cambria Math" panose="02040503050406030204" pitchFamily="18" charset="0"/>
+                          </a:rPr>
+                        </m:ctrlPr>
+                      </m:sSubPr>
+                      <m:e>
+                        <m:r>
+                          <a:rPr lang="en-US" altLang="zh-CN" sz="1100" i="1" dirty="0" smtClean="0">
+                            <a:latin typeface="Cambria Math" panose="02040503050406030204" pitchFamily="18" charset="0"/>
+                          </a:rPr>
+                          <m:t>𝑤</m:t>
+                        </m:r>
+                      </m:e>
+                      <m:sub>
+                        <m:r>
+                          <a:rPr lang="en-US" altLang="zh-CN" sz="1100" i="1" dirty="0" smtClean="0">
+                            <a:latin typeface="Cambria Math" panose="02040503050406030204" pitchFamily="18" charset="0"/>
+                          </a:rPr>
+                          <m:t>𝑛</m:t>
+                        </m:r>
+                      </m:sub>
+                    </m:sSub>
+                  </m:oMath>
+                </a14:m>
+                <a:endParaRPr lang="zh-CN" altLang="en-US" sz="1100" dirty="0"/>
+              </a:p>
+            </p:txBody>
+          </p:sp>
+        </mc:Choice>
+        <mc:Fallback>
+          <p:sp>
+            <p:nvSpPr>
+              <p:cNvPr id="83" name="矩形: 圆角 82">
+                <a:extLst>
+                  <a:ext uri="{FF2B5EF4-FFF2-40B4-BE49-F238E27FC236}">
+                    <a16:creationId xmlns:a16="http://schemas.microsoft.com/office/drawing/2014/main" id="{B501D2D7-1DCB-411A-86F5-920EE0DCBA34}"/>
+                  </a:ext>
+                </a:extLst>
+              </p:cNvPr>
+              <p:cNvSpPr>
+                <a:spLocks noRot="1" noChangeAspect="1" noMove="1" noResize="1" noEditPoints="1" noAdjustHandles="1" noChangeArrowheads="1" noChangeShapeType="1" noTextEdit="1"/>
+              </p:cNvSpPr>
+              <p:nvPr/>
+            </p:nvSpPr>
+            <p:spPr>
+              <a:xfrm>
+                <a:off x="3330317" y="4502062"/>
+                <a:ext cx="982410" cy="283807"/>
+              </a:xfrm>
+              <a:prstGeom prst="roundRect">
+                <a:avLst>
+                  <a:gd name="adj" fmla="val 50000"/>
+                </a:avLst>
+              </a:prstGeom>
+              <a:blipFill>
+                <a:blip r:embed="rId3"/>
+                <a:stretch>
+                  <a:fillRect/>
+                </a:stretch>
+              </a:blipFill>
+              <a:ln w="9525">
+                <a:solidFill>
+                  <a:schemeClr val="tx1"/>
+                </a:solidFill>
+                <a:headEnd type="none" w="med" len="med"/>
+                <a:tailEnd type="triangle" w="med" len="med"/>
+              </a:ln>
+              <a:effectLst>
+                <a:outerShdw blurRad="50800" dist="38100" dir="2700000" algn="tl" rotWithShape="0">
+                  <a:prstClr val="black">
+                    <a:alpha val="40000"/>
+                  </a:prstClr>
+                </a:outerShdw>
+              </a:effectLst>
+            </p:spPr>
+            <p:txBody>
+              <a:bodyPr/>
+              <a:lstStyle/>
+              <a:p>
+                <a:r>
+                  <a:rPr lang="zh-CN" altLang="en-US">
+                    <a:noFill/>
+                  </a:rPr>
+                  <a:t> </a:t>
+                </a:r>
+              </a:p>
+            </p:txBody>
+          </p:sp>
+        </mc:Fallback>
+      </mc:AlternateContent>
+      <p:sp>
+        <p:nvSpPr>
+          <p:cNvPr id="47" name="文本框 46">
+            <a:extLst>
+              <a:ext uri="{FF2B5EF4-FFF2-40B4-BE49-F238E27FC236}">
+                <a16:creationId xmlns:a16="http://schemas.microsoft.com/office/drawing/2014/main" id="{5BE70529-35A3-42F5-8D0E-722A5F944302}"/>
+              </a:ext>
+            </a:extLst>
+          </p:cNvPr>
+          <p:cNvSpPr txBox="1"/>
+          <p:nvPr/>
+        </p:nvSpPr>
+        <p:spPr>
+          <a:xfrm>
+            <a:off x="875874" y="1732774"/>
+            <a:ext cx="447558" cy="369332"/>
+          </a:xfrm>
+          <a:prstGeom prst="rect">
+            <a:avLst/>
+          </a:prstGeom>
+          <a:noFill/>
+        </p:spPr>
+        <p:txBody>
+          <a:bodyPr wrap="none" rtlCol="0">
+            <a:spAutoFit/>
+          </a:bodyPr>
+          <a:lstStyle/>
+          <a:p>
+            <a:r>
+              <a:rPr lang="en-US" altLang="zh-CN" dirty="0"/>
+              <a:t>N*</a:t>
+            </a:r>
+            <a:endParaRPr lang="zh-CN" altLang="en-US" dirty="0"/>
+          </a:p>
+        </p:txBody>
+      </p:sp>
+    </p:spTree>
+    <p:extLst>
+      <p:ext uri="{BB962C8B-B14F-4D97-AF65-F5344CB8AC3E}">
+        <p14:creationId xmlns:p14="http://schemas.microsoft.com/office/powerpoint/2010/main" val="2482054672"/>
       </p:ext>
     </p:extLst>
   </p:cSld>
@@ -10112,6 +12235,925 @@
       </p:grpSpPr>
       <p:grpSp>
         <p:nvGrpSpPr>
+          <p:cNvPr id="2" name="组合 1">
+            <a:extLst>
+              <a:ext uri="{FF2B5EF4-FFF2-40B4-BE49-F238E27FC236}">
+                <a16:creationId xmlns:a16="http://schemas.microsoft.com/office/drawing/2014/main" id="{69EE3256-D7AE-441B-98F7-3030D25A0A2A}"/>
+              </a:ext>
+            </a:extLst>
+          </p:cNvPr>
+          <p:cNvGrpSpPr/>
+          <p:nvPr/>
+        </p:nvGrpSpPr>
+        <p:grpSpPr>
+          <a:xfrm>
+            <a:off x="973804" y="1268301"/>
+            <a:ext cx="4910391" cy="2606898"/>
+            <a:chOff x="973802" y="1268301"/>
+            <a:chExt cx="4910391" cy="2606898"/>
+          </a:xfrm>
+        </p:grpSpPr>
+        <mc:AlternateContent xmlns:mc="http://schemas.openxmlformats.org/markup-compatibility/2006" xmlns:a14="http://schemas.microsoft.com/office/drawing/2010/main">
+          <mc:Choice Requires="a14">
+            <p:sp>
+              <p:nvSpPr>
+                <p:cNvPr id="4" name="矩形: 圆角 3">
+                  <a:extLst>
+                    <a:ext uri="{FF2B5EF4-FFF2-40B4-BE49-F238E27FC236}">
+                      <a16:creationId xmlns:a16="http://schemas.microsoft.com/office/drawing/2014/main" id="{76AD63DA-0675-45D8-AFE2-73C2907E467E}"/>
+                    </a:ext>
+                  </a:extLst>
+                </p:cNvPr>
+                <p:cNvSpPr/>
+                <p:nvPr/>
+              </p:nvSpPr>
+              <p:spPr>
+                <a:xfrm>
+                  <a:off x="973802" y="3591391"/>
+                  <a:ext cx="4910385" cy="283808"/>
+                </a:xfrm>
+                <a:prstGeom prst="roundRect">
+                  <a:avLst>
+                    <a:gd name="adj" fmla="val 50000"/>
+                  </a:avLst>
+                </a:prstGeom>
+                <a:ln w="9525">
+                  <a:solidFill>
+                    <a:schemeClr val="tx1"/>
+                  </a:solidFill>
+                  <a:headEnd type="none" w="med" len="med"/>
+                  <a:tailEnd type="triangle" w="med" len="med"/>
+                </a:ln>
+                <a:effectLst>
+                  <a:outerShdw blurRad="50800" dist="38100" dir="2700000" algn="tl" rotWithShape="0">
+                    <a:prstClr val="black">
+                      <a:alpha val="40000"/>
+                    </a:prstClr>
+                  </a:outerShdw>
+                </a:effectLst>
+              </p:spPr>
+              <p:style>
+                <a:lnRef idx="2">
+                  <a:schemeClr val="dk1"/>
+                </a:lnRef>
+                <a:fillRef idx="1">
+                  <a:schemeClr val="lt1"/>
+                </a:fillRef>
+                <a:effectRef idx="0">
+                  <a:schemeClr val="dk1"/>
+                </a:effectRef>
+                <a:fontRef idx="minor">
+                  <a:schemeClr val="dk1"/>
+                </a:fontRef>
+              </p:style>
+              <p:txBody>
+                <a:bodyPr rtlCol="0" anchor="ctr"/>
+                <a:lstStyle/>
+                <a:p>
+                  <a:pPr algn="ctr"/>
+                  <a14:m>
+                    <m:oMath xmlns:m="http://schemas.openxmlformats.org/officeDocument/2006/math">
+                      <m:sSub>
+                        <m:sSubPr>
+                          <m:ctrlPr>
+                            <a:rPr lang="en-US" altLang="zh-CN" sz="1100" i="1" dirty="0" smtClean="0">
+                              <a:latin typeface="Cambria Math" panose="02040503050406030204" pitchFamily="18" charset="0"/>
+                            </a:rPr>
+                          </m:ctrlPr>
+                        </m:sSubPr>
+                        <m:e>
+                          <m:r>
+                            <a:rPr lang="en-US" altLang="zh-CN" sz="1100" i="1" dirty="0" smtClean="0">
+                              <a:latin typeface="Cambria Math" panose="02040503050406030204" pitchFamily="18" charset="0"/>
+                            </a:rPr>
+                            <m:t>𝑤</m:t>
+                          </m:r>
+                        </m:e>
+                        <m:sub>
+                          <m:r>
+                            <a:rPr lang="en-US" altLang="zh-CN" sz="1100" i="1" dirty="0" smtClean="0">
+                              <a:latin typeface="Cambria Math" panose="02040503050406030204" pitchFamily="18" charset="0"/>
+                            </a:rPr>
+                            <m:t>1</m:t>
+                          </m:r>
+                        </m:sub>
+                      </m:sSub>
+                    </m:oMath>
+                  </a14:m>
+                  <a:r>
+                    <a:rPr lang="en-US" altLang="zh-CN" sz="1100" dirty="0"/>
+                    <a:t> </a:t>
+                  </a:r>
+                  <a14:m>
+                    <m:oMath xmlns:m="http://schemas.openxmlformats.org/officeDocument/2006/math">
+                      <m:sSub>
+                        <m:sSubPr>
+                          <m:ctrlPr>
+                            <a:rPr lang="en-US" altLang="zh-CN" sz="1100" i="1" dirty="0">
+                              <a:latin typeface="Cambria Math" panose="02040503050406030204" pitchFamily="18" charset="0"/>
+                            </a:rPr>
+                          </m:ctrlPr>
+                        </m:sSubPr>
+                        <m:e>
+                          <m:r>
+                            <a:rPr lang="en-US" altLang="zh-CN" sz="1100" i="1" dirty="0" smtClean="0">
+                              <a:latin typeface="Cambria Math" panose="02040503050406030204" pitchFamily="18" charset="0"/>
+                            </a:rPr>
+                            <m:t>𝑤</m:t>
+                          </m:r>
+                        </m:e>
+                        <m:sub>
+                          <m:r>
+                            <a:rPr lang="en-US" altLang="zh-CN" sz="1100" i="1" dirty="0" smtClean="0">
+                              <a:latin typeface="Cambria Math" panose="02040503050406030204" pitchFamily="18" charset="0"/>
+                            </a:rPr>
+                            <m:t>2</m:t>
+                          </m:r>
+                        </m:sub>
+                      </m:sSub>
+                    </m:oMath>
+                  </a14:m>
+                  <a:r>
+                    <a:rPr lang="en-US" altLang="zh-CN" sz="1100" dirty="0"/>
+                    <a:t> … </a:t>
+                  </a:r>
+                  <a14:m>
+                    <m:oMath xmlns:m="http://schemas.openxmlformats.org/officeDocument/2006/math">
+                      <m:sSub>
+                        <m:sSubPr>
+                          <m:ctrlPr>
+                            <a:rPr lang="en-US" altLang="zh-CN" sz="1100" i="1" dirty="0">
+                              <a:latin typeface="Cambria Math" panose="02040503050406030204" pitchFamily="18" charset="0"/>
+                            </a:rPr>
+                          </m:ctrlPr>
+                        </m:sSubPr>
+                        <m:e>
+                          <m:r>
+                            <a:rPr lang="en-US" altLang="zh-CN" sz="1100" i="1" dirty="0" smtClean="0">
+                              <a:latin typeface="Cambria Math" panose="02040503050406030204" pitchFamily="18" charset="0"/>
+                            </a:rPr>
+                            <m:t>𝑤</m:t>
+                          </m:r>
+                        </m:e>
+                        <m:sub>
+                          <m:r>
+                            <a:rPr lang="en-US" altLang="zh-CN" sz="1100" i="1" dirty="0" smtClean="0">
+                              <a:latin typeface="Cambria Math" panose="02040503050406030204" pitchFamily="18" charset="0"/>
+                            </a:rPr>
+                            <m:t>𝑛</m:t>
+                          </m:r>
+                          <m:r>
+                            <a:rPr lang="en-US" altLang="zh-CN" sz="1100" i="1" dirty="0" smtClean="0">
+                              <a:latin typeface="Cambria Math" panose="02040503050406030204" pitchFamily="18" charset="0"/>
+                            </a:rPr>
+                            <m:t>−1</m:t>
+                          </m:r>
+                        </m:sub>
+                      </m:sSub>
+                    </m:oMath>
+                  </a14:m>
+                  <a:r>
+                    <a:rPr lang="zh-CN" altLang="en-US" sz="1100" dirty="0"/>
+                    <a:t> </a:t>
+                  </a:r>
+                  <a14:m>
+                    <m:oMath xmlns:m="http://schemas.openxmlformats.org/officeDocument/2006/math">
+                      <m:sSub>
+                        <m:sSubPr>
+                          <m:ctrlPr>
+                            <a:rPr lang="en-US" altLang="zh-CN" sz="1100" i="1" dirty="0">
+                              <a:latin typeface="Cambria Math" panose="02040503050406030204" pitchFamily="18" charset="0"/>
+                            </a:rPr>
+                          </m:ctrlPr>
+                        </m:sSubPr>
+                        <m:e>
+                          <m:r>
+                            <a:rPr lang="en-US" altLang="zh-CN" sz="1100" i="1" dirty="0" smtClean="0">
+                              <a:latin typeface="Cambria Math" panose="02040503050406030204" pitchFamily="18" charset="0"/>
+                            </a:rPr>
+                            <m:t>𝑤</m:t>
+                          </m:r>
+                        </m:e>
+                        <m:sub>
+                          <m:r>
+                            <a:rPr lang="en-US" altLang="zh-CN" sz="1100" i="1" dirty="0" smtClean="0">
+                              <a:latin typeface="Cambria Math" panose="02040503050406030204" pitchFamily="18" charset="0"/>
+                            </a:rPr>
+                            <m:t>𝑛</m:t>
+                          </m:r>
+                        </m:sub>
+                      </m:sSub>
+                    </m:oMath>
+                  </a14:m>
+                  <a:endParaRPr lang="zh-CN" altLang="en-US" sz="1100" dirty="0"/>
+                </a:p>
+              </p:txBody>
+            </p:sp>
+          </mc:Choice>
+          <mc:Fallback xmlns="">
+            <p:sp>
+              <p:nvSpPr>
+                <p:cNvPr id="4" name="矩形: 圆角 3">
+                  <a:extLst>
+                    <a:ext uri="{FF2B5EF4-FFF2-40B4-BE49-F238E27FC236}">
+                      <a16:creationId xmlns:a16="http://schemas.microsoft.com/office/drawing/2014/main" id="{76AD63DA-0675-45D8-AFE2-73C2907E467E}"/>
+                    </a:ext>
+                  </a:extLst>
+                </p:cNvPr>
+                <p:cNvSpPr>
+                  <a:spLocks noRot="1" noChangeAspect="1" noMove="1" noResize="1" noEditPoints="1" noAdjustHandles="1" noChangeArrowheads="1" noChangeShapeType="1" noTextEdit="1"/>
+                </p:cNvSpPr>
+                <p:nvPr/>
+              </p:nvSpPr>
+              <p:spPr>
+                <a:xfrm>
+                  <a:off x="973802" y="3591391"/>
+                  <a:ext cx="4910385" cy="283808"/>
+                </a:xfrm>
+                <a:prstGeom prst="roundRect">
+                  <a:avLst>
+                    <a:gd name="adj" fmla="val 50000"/>
+                  </a:avLst>
+                </a:prstGeom>
+                <a:blipFill>
+                  <a:blip r:embed="rId3"/>
+                  <a:stretch>
+                    <a:fillRect/>
+                  </a:stretch>
+                </a:blipFill>
+                <a:ln w="9525">
+                  <a:solidFill>
+                    <a:schemeClr val="tx1"/>
+                  </a:solidFill>
+                  <a:headEnd type="none" w="med" len="med"/>
+                  <a:tailEnd type="triangle" w="med" len="med"/>
+                </a:ln>
+                <a:effectLst>
+                  <a:outerShdw blurRad="50800" dist="38100" dir="2700000" algn="tl" rotWithShape="0">
+                    <a:prstClr val="black">
+                      <a:alpha val="40000"/>
+                    </a:prstClr>
+                  </a:outerShdw>
+                </a:effectLst>
+              </p:spPr>
+              <p:txBody>
+                <a:bodyPr/>
+                <a:lstStyle/>
+                <a:p>
+                  <a:r>
+                    <a:rPr lang="zh-CN" altLang="en-US">
+                      <a:noFill/>
+                    </a:rPr>
+                    <a:t> </a:t>
+                  </a:r>
+                </a:p>
+              </p:txBody>
+            </p:sp>
+          </mc:Fallback>
+        </mc:AlternateContent>
+        <p:sp>
+          <p:nvSpPr>
+            <p:cNvPr id="87" name="矩形: 圆角 86">
+              <a:extLst>
+                <a:ext uri="{FF2B5EF4-FFF2-40B4-BE49-F238E27FC236}">
+                  <a16:creationId xmlns:a16="http://schemas.microsoft.com/office/drawing/2014/main" id="{C2715085-FC95-4869-A90E-FE520C3D2BF7}"/>
+                </a:ext>
+              </a:extLst>
+            </p:cNvPr>
+            <p:cNvSpPr/>
+            <p:nvPr/>
+          </p:nvSpPr>
+          <p:spPr>
+            <a:xfrm>
+              <a:off x="973808" y="3126774"/>
+              <a:ext cx="4910385" cy="283808"/>
+            </a:xfrm>
+            <a:prstGeom prst="roundRect">
+              <a:avLst>
+                <a:gd name="adj" fmla="val 50000"/>
+              </a:avLst>
+            </a:prstGeom>
+            <a:ln w="9525">
+              <a:solidFill>
+                <a:schemeClr val="tx1"/>
+              </a:solidFill>
+              <a:headEnd type="none" w="med" len="med"/>
+              <a:tailEnd type="triangle" w="med" len="med"/>
+            </a:ln>
+            <a:effectLst>
+              <a:outerShdw blurRad="50800" dist="38100" dir="2700000" algn="tl" rotWithShape="0">
+                <a:prstClr val="black">
+                  <a:alpha val="40000"/>
+                </a:prstClr>
+              </a:outerShdw>
+            </a:effectLst>
+          </p:spPr>
+          <p:style>
+            <a:lnRef idx="2">
+              <a:schemeClr val="dk1"/>
+            </a:lnRef>
+            <a:fillRef idx="1">
+              <a:schemeClr val="lt1"/>
+            </a:fillRef>
+            <a:effectRef idx="0">
+              <a:schemeClr val="dk1"/>
+            </a:effectRef>
+            <a:fontRef idx="minor">
+              <a:schemeClr val="dk1"/>
+            </a:fontRef>
+          </p:style>
+          <p:txBody>
+            <a:bodyPr rtlCol="0" anchor="ctr"/>
+            <a:lstStyle/>
+            <a:p>
+              <a:pPr algn="ctr"/>
+              <a:r>
+                <a:rPr lang="en-US" altLang="zh-CN" sz="1100" dirty="0">
+                  <a:latin typeface="Consolas" panose="020B0609020204030204" pitchFamily="49" charset="0"/>
+                </a:rPr>
+                <a:t>Embedding</a:t>
+              </a:r>
+              <a:endParaRPr lang="zh-CN" altLang="en-US" sz="1100" dirty="0">
+                <a:latin typeface="Consolas" panose="020B0609020204030204" pitchFamily="49" charset="0"/>
+              </a:endParaRPr>
+            </a:p>
+          </p:txBody>
+        </p:sp>
+        <p:cxnSp>
+          <p:nvCxnSpPr>
+            <p:cNvPr id="97" name="直接箭头连接符 96">
+              <a:extLst>
+                <a:ext uri="{FF2B5EF4-FFF2-40B4-BE49-F238E27FC236}">
+                  <a16:creationId xmlns:a16="http://schemas.microsoft.com/office/drawing/2014/main" id="{2B94151C-A032-4536-A78E-C7A9A6110E31}"/>
+                </a:ext>
+              </a:extLst>
+            </p:cNvPr>
+            <p:cNvCxnSpPr>
+              <a:cxnSpLocks/>
+              <a:stCxn id="4" idx="0"/>
+              <a:endCxn id="87" idx="2"/>
+            </p:cNvCxnSpPr>
+            <p:nvPr/>
+          </p:nvCxnSpPr>
+          <p:spPr>
+            <a:xfrm flipV="1">
+              <a:off x="3428995" y="3410582"/>
+              <a:ext cx="6" cy="180809"/>
+            </a:xfrm>
+            <a:prstGeom prst="straightConnector1">
+              <a:avLst/>
+            </a:prstGeom>
+            <a:ln>
+              <a:solidFill>
+                <a:schemeClr val="tx1"/>
+              </a:solidFill>
+              <a:headEnd type="none" w="med" len="med"/>
+              <a:tailEnd type="triangle" w="med" len="med"/>
+            </a:ln>
+            <a:effectLst>
+              <a:outerShdw blurRad="50800" dist="38100" dir="2700000" algn="tl" rotWithShape="0">
+                <a:prstClr val="black">
+                  <a:alpha val="40000"/>
+                </a:prstClr>
+              </a:outerShdw>
+            </a:effectLst>
+          </p:spPr>
+          <p:style>
+            <a:lnRef idx="1">
+              <a:schemeClr val="accent1"/>
+            </a:lnRef>
+            <a:fillRef idx="0">
+              <a:schemeClr val="accent1"/>
+            </a:fillRef>
+            <a:effectRef idx="0">
+              <a:schemeClr val="accent1"/>
+            </a:effectRef>
+            <a:fontRef idx="minor">
+              <a:schemeClr val="tx1"/>
+            </a:fontRef>
+          </p:style>
+        </p:cxnSp>
+        <p:sp>
+          <p:nvSpPr>
+            <p:cNvPr id="124" name="矩形: 圆角 123">
+              <a:extLst>
+                <a:ext uri="{FF2B5EF4-FFF2-40B4-BE49-F238E27FC236}">
+                  <a16:creationId xmlns:a16="http://schemas.microsoft.com/office/drawing/2014/main" id="{9FE4A861-FC4D-4473-9641-53D85CD5B63B}"/>
+                </a:ext>
+              </a:extLst>
+            </p:cNvPr>
+            <p:cNvSpPr/>
+            <p:nvPr/>
+          </p:nvSpPr>
+          <p:spPr>
+            <a:xfrm>
+              <a:off x="973806" y="2662157"/>
+              <a:ext cx="4910385" cy="283808"/>
+            </a:xfrm>
+            <a:prstGeom prst="roundRect">
+              <a:avLst>
+                <a:gd name="adj" fmla="val 50000"/>
+              </a:avLst>
+            </a:prstGeom>
+            <a:ln w="9525">
+              <a:solidFill>
+                <a:schemeClr val="tx1"/>
+              </a:solidFill>
+              <a:headEnd type="none" w="med" len="med"/>
+              <a:tailEnd type="triangle" w="med" len="med"/>
+            </a:ln>
+            <a:effectLst>
+              <a:outerShdw blurRad="50800" dist="38100" dir="2700000" algn="tl" rotWithShape="0">
+                <a:prstClr val="black">
+                  <a:alpha val="40000"/>
+                </a:prstClr>
+              </a:outerShdw>
+            </a:effectLst>
+          </p:spPr>
+          <p:style>
+            <a:lnRef idx="2">
+              <a:schemeClr val="dk1"/>
+            </a:lnRef>
+            <a:fillRef idx="1">
+              <a:schemeClr val="lt1"/>
+            </a:fillRef>
+            <a:effectRef idx="0">
+              <a:schemeClr val="dk1"/>
+            </a:effectRef>
+            <a:fontRef idx="minor">
+              <a:schemeClr val="dk1"/>
+            </a:fontRef>
+          </p:style>
+          <p:txBody>
+            <a:bodyPr rtlCol="0" anchor="ctr"/>
+            <a:lstStyle/>
+            <a:p>
+              <a:pPr algn="ctr"/>
+              <a:r>
+                <a:rPr lang="en-US" altLang="zh-CN" sz="1100" dirty="0">
+                  <a:latin typeface="Consolas" panose="020B0609020204030204" pitchFamily="49" charset="0"/>
+                </a:rPr>
+                <a:t>Bidirectional RNN (LSTM/GRU)</a:t>
+              </a:r>
+              <a:endParaRPr lang="zh-CN" altLang="en-US" sz="1100" dirty="0">
+                <a:latin typeface="Consolas" panose="020B0609020204030204" pitchFamily="49" charset="0"/>
+              </a:endParaRPr>
+            </a:p>
+          </p:txBody>
+        </p:sp>
+        <p:cxnSp>
+          <p:nvCxnSpPr>
+            <p:cNvPr id="129" name="直接箭头连接符 128">
+              <a:extLst>
+                <a:ext uri="{FF2B5EF4-FFF2-40B4-BE49-F238E27FC236}">
+                  <a16:creationId xmlns:a16="http://schemas.microsoft.com/office/drawing/2014/main" id="{9E68E260-B31A-44DD-8597-04F4BE714870}"/>
+                </a:ext>
+              </a:extLst>
+            </p:cNvPr>
+            <p:cNvCxnSpPr>
+              <a:cxnSpLocks/>
+              <a:stCxn id="87" idx="0"/>
+              <a:endCxn id="124" idx="2"/>
+            </p:cNvCxnSpPr>
+            <p:nvPr/>
+          </p:nvCxnSpPr>
+          <p:spPr>
+            <a:xfrm flipH="1" flipV="1">
+              <a:off x="3428999" y="2945965"/>
+              <a:ext cx="2" cy="180809"/>
+            </a:xfrm>
+            <a:prstGeom prst="straightConnector1">
+              <a:avLst/>
+            </a:prstGeom>
+            <a:ln>
+              <a:solidFill>
+                <a:schemeClr val="tx1"/>
+              </a:solidFill>
+              <a:headEnd type="none" w="med" len="med"/>
+              <a:tailEnd type="triangle" w="med" len="med"/>
+            </a:ln>
+            <a:effectLst>
+              <a:outerShdw blurRad="50800" dist="38100" dir="2700000" algn="tl" rotWithShape="0">
+                <a:prstClr val="black">
+                  <a:alpha val="40000"/>
+                </a:prstClr>
+              </a:outerShdw>
+            </a:effectLst>
+          </p:spPr>
+          <p:style>
+            <a:lnRef idx="1">
+              <a:schemeClr val="accent1"/>
+            </a:lnRef>
+            <a:fillRef idx="0">
+              <a:schemeClr val="accent1"/>
+            </a:fillRef>
+            <a:effectRef idx="0">
+              <a:schemeClr val="accent1"/>
+            </a:effectRef>
+            <a:fontRef idx="minor">
+              <a:schemeClr val="tx1"/>
+            </a:fontRef>
+          </p:style>
+        </p:cxnSp>
+        <p:sp>
+          <p:nvSpPr>
+            <p:cNvPr id="136" name="矩形: 圆角 135">
+              <a:extLst>
+                <a:ext uri="{FF2B5EF4-FFF2-40B4-BE49-F238E27FC236}">
+                  <a16:creationId xmlns:a16="http://schemas.microsoft.com/office/drawing/2014/main" id="{93739E43-4448-4A8F-9BD7-944090B4CC88}"/>
+                </a:ext>
+              </a:extLst>
+            </p:cNvPr>
+            <p:cNvSpPr/>
+            <p:nvPr/>
+          </p:nvSpPr>
+          <p:spPr>
+            <a:xfrm>
+              <a:off x="973806" y="2197539"/>
+              <a:ext cx="4910385" cy="283808"/>
+            </a:xfrm>
+            <a:prstGeom prst="roundRect">
+              <a:avLst>
+                <a:gd name="adj" fmla="val 50000"/>
+              </a:avLst>
+            </a:prstGeom>
+            <a:ln w="9525">
+              <a:solidFill>
+                <a:schemeClr val="tx1"/>
+              </a:solidFill>
+              <a:headEnd type="none" w="med" len="med"/>
+              <a:tailEnd type="triangle" w="med" len="med"/>
+            </a:ln>
+            <a:effectLst>
+              <a:outerShdw blurRad="50800" dist="38100" dir="2700000" algn="tl" rotWithShape="0">
+                <a:prstClr val="black">
+                  <a:alpha val="40000"/>
+                </a:prstClr>
+              </a:outerShdw>
+            </a:effectLst>
+          </p:spPr>
+          <p:style>
+            <a:lnRef idx="2">
+              <a:schemeClr val="dk1"/>
+            </a:lnRef>
+            <a:fillRef idx="1">
+              <a:schemeClr val="lt1"/>
+            </a:fillRef>
+            <a:effectRef idx="0">
+              <a:schemeClr val="dk1"/>
+            </a:effectRef>
+            <a:fontRef idx="minor">
+              <a:schemeClr val="dk1"/>
+            </a:fontRef>
+          </p:style>
+          <p:txBody>
+            <a:bodyPr rtlCol="0" anchor="ctr"/>
+            <a:lstStyle/>
+            <a:p>
+              <a:pPr algn="ctr"/>
+              <a:r>
+                <a:rPr lang="en-US" altLang="zh-CN" sz="1100" dirty="0">
+                  <a:latin typeface="Consolas" panose="020B0609020204030204" pitchFamily="49" charset="0"/>
+                </a:rPr>
+                <a:t>Self-Attention</a:t>
+              </a:r>
+              <a:endParaRPr lang="zh-CN" altLang="en-US" sz="1100" dirty="0">
+                <a:latin typeface="Consolas" panose="020B0609020204030204" pitchFamily="49" charset="0"/>
+              </a:endParaRPr>
+            </a:p>
+          </p:txBody>
+        </p:sp>
+        <p:sp>
+          <p:nvSpPr>
+            <p:cNvPr id="139" name="矩形: 圆角 138">
+              <a:extLst>
+                <a:ext uri="{FF2B5EF4-FFF2-40B4-BE49-F238E27FC236}">
+                  <a16:creationId xmlns:a16="http://schemas.microsoft.com/office/drawing/2014/main" id="{3CEC3DAD-DB89-4A50-B4B9-C1C75065BA27}"/>
+                </a:ext>
+              </a:extLst>
+            </p:cNvPr>
+            <p:cNvSpPr/>
+            <p:nvPr/>
+          </p:nvSpPr>
+          <p:spPr>
+            <a:xfrm>
+              <a:off x="973806" y="1732919"/>
+              <a:ext cx="4910385" cy="283808"/>
+            </a:xfrm>
+            <a:prstGeom prst="roundRect">
+              <a:avLst>
+                <a:gd name="adj" fmla="val 50000"/>
+              </a:avLst>
+            </a:prstGeom>
+            <a:ln w="9525">
+              <a:solidFill>
+                <a:schemeClr val="tx1"/>
+              </a:solidFill>
+              <a:headEnd type="none" w="med" len="med"/>
+              <a:tailEnd type="triangle" w="med" len="med"/>
+            </a:ln>
+            <a:effectLst>
+              <a:outerShdw blurRad="50800" dist="38100" dir="2700000" algn="tl" rotWithShape="0">
+                <a:prstClr val="black">
+                  <a:alpha val="40000"/>
+                </a:prstClr>
+              </a:outerShdw>
+            </a:effectLst>
+          </p:spPr>
+          <p:style>
+            <a:lnRef idx="2">
+              <a:schemeClr val="dk1"/>
+            </a:lnRef>
+            <a:fillRef idx="1">
+              <a:schemeClr val="lt1"/>
+            </a:fillRef>
+            <a:effectRef idx="0">
+              <a:schemeClr val="dk1"/>
+            </a:effectRef>
+            <a:fontRef idx="minor">
+              <a:schemeClr val="dk1"/>
+            </a:fontRef>
+          </p:style>
+          <p:txBody>
+            <a:bodyPr rtlCol="0" anchor="ctr"/>
+            <a:lstStyle/>
+            <a:p>
+              <a:pPr algn="ctr"/>
+              <a:r>
+                <a:rPr lang="en-US" altLang="zh-CN" sz="1100" dirty="0">
+                  <a:latin typeface="Consolas" panose="020B0609020204030204" pitchFamily="49" charset="0"/>
+                </a:rPr>
+                <a:t>FullyConnectedLayer</a:t>
+              </a:r>
+              <a:endParaRPr lang="zh-CN" altLang="en-US" sz="1100" dirty="0">
+                <a:latin typeface="Consolas" panose="020B0609020204030204" pitchFamily="49" charset="0"/>
+              </a:endParaRPr>
+            </a:p>
+          </p:txBody>
+        </p:sp>
+        <p:sp>
+          <p:nvSpPr>
+            <p:cNvPr id="141" name="矩形: 圆角 140">
+              <a:extLst>
+                <a:ext uri="{FF2B5EF4-FFF2-40B4-BE49-F238E27FC236}">
+                  <a16:creationId xmlns:a16="http://schemas.microsoft.com/office/drawing/2014/main" id="{5528891A-772D-4892-B168-D3359CCA10BE}"/>
+                </a:ext>
+              </a:extLst>
+            </p:cNvPr>
+            <p:cNvSpPr/>
+            <p:nvPr/>
+          </p:nvSpPr>
+          <p:spPr>
+            <a:xfrm>
+              <a:off x="973806" y="1268301"/>
+              <a:ext cx="4910385" cy="283808"/>
+            </a:xfrm>
+            <a:prstGeom prst="roundRect">
+              <a:avLst>
+                <a:gd name="adj" fmla="val 50000"/>
+              </a:avLst>
+            </a:prstGeom>
+            <a:ln w="9525">
+              <a:solidFill>
+                <a:schemeClr val="tx1"/>
+              </a:solidFill>
+              <a:headEnd type="none" w="med" len="med"/>
+              <a:tailEnd type="triangle" w="med" len="med"/>
+            </a:ln>
+            <a:effectLst>
+              <a:outerShdw blurRad="50800" dist="38100" dir="2700000" algn="tl" rotWithShape="0">
+                <a:prstClr val="black">
+                  <a:alpha val="40000"/>
+                </a:prstClr>
+              </a:outerShdw>
+            </a:effectLst>
+          </p:spPr>
+          <p:style>
+            <a:lnRef idx="2">
+              <a:schemeClr val="dk1"/>
+            </a:lnRef>
+            <a:fillRef idx="1">
+              <a:schemeClr val="lt1"/>
+            </a:fillRef>
+            <a:effectRef idx="0">
+              <a:schemeClr val="dk1"/>
+            </a:effectRef>
+            <a:fontRef idx="minor">
+              <a:schemeClr val="dk1"/>
+            </a:fontRef>
+          </p:style>
+          <p:txBody>
+            <a:bodyPr rtlCol="0" anchor="ctr"/>
+            <a:lstStyle/>
+            <a:p>
+              <a:pPr algn="ctr"/>
+              <a:r>
+                <a:rPr lang="en-US" altLang="zh-CN" sz="1100" dirty="0">
+                  <a:latin typeface="Consolas" panose="020B0609020204030204" pitchFamily="49" charset="0"/>
+                </a:rPr>
+                <a:t>Sigmoid/Softmax</a:t>
+              </a:r>
+              <a:endParaRPr lang="zh-CN" altLang="en-US" sz="1100" dirty="0">
+                <a:latin typeface="Consolas" panose="020B0609020204030204" pitchFamily="49" charset="0"/>
+              </a:endParaRPr>
+            </a:p>
+          </p:txBody>
+        </p:sp>
+        <p:cxnSp>
+          <p:nvCxnSpPr>
+            <p:cNvPr id="142" name="直接箭头连接符 141">
+              <a:extLst>
+                <a:ext uri="{FF2B5EF4-FFF2-40B4-BE49-F238E27FC236}">
+                  <a16:creationId xmlns:a16="http://schemas.microsoft.com/office/drawing/2014/main" id="{7CCDD255-4D7D-46C9-A0F4-76039BCA81A0}"/>
+                </a:ext>
+              </a:extLst>
+            </p:cNvPr>
+            <p:cNvCxnSpPr>
+              <a:cxnSpLocks/>
+              <a:stCxn id="124" idx="0"/>
+              <a:endCxn id="136" idx="2"/>
+            </p:cNvCxnSpPr>
+            <p:nvPr/>
+          </p:nvCxnSpPr>
+          <p:spPr>
+            <a:xfrm flipV="1">
+              <a:off x="3428998" y="2481346"/>
+              <a:ext cx="0" cy="180810"/>
+            </a:xfrm>
+            <a:prstGeom prst="straightConnector1">
+              <a:avLst/>
+            </a:prstGeom>
+            <a:ln>
+              <a:solidFill>
+                <a:schemeClr val="tx1"/>
+              </a:solidFill>
+              <a:headEnd type="none" w="med" len="med"/>
+              <a:tailEnd type="triangle" w="med" len="med"/>
+            </a:ln>
+            <a:effectLst>
+              <a:outerShdw blurRad="50800" dist="38100" dir="2700000" algn="tl" rotWithShape="0">
+                <a:prstClr val="black">
+                  <a:alpha val="40000"/>
+                </a:prstClr>
+              </a:outerShdw>
+            </a:effectLst>
+          </p:spPr>
+          <p:style>
+            <a:lnRef idx="1">
+              <a:schemeClr val="accent1"/>
+            </a:lnRef>
+            <a:fillRef idx="0">
+              <a:schemeClr val="accent1"/>
+            </a:fillRef>
+            <a:effectRef idx="0">
+              <a:schemeClr val="accent1"/>
+            </a:effectRef>
+            <a:fontRef idx="minor">
+              <a:schemeClr val="tx1"/>
+            </a:fontRef>
+          </p:style>
+        </p:cxnSp>
+        <p:cxnSp>
+          <p:nvCxnSpPr>
+            <p:cNvPr id="144" name="直接箭头连接符 143">
+              <a:extLst>
+                <a:ext uri="{FF2B5EF4-FFF2-40B4-BE49-F238E27FC236}">
+                  <a16:creationId xmlns:a16="http://schemas.microsoft.com/office/drawing/2014/main" id="{ED6845CB-AC0C-40C3-BD1D-AFE7C198C291}"/>
+                </a:ext>
+              </a:extLst>
+            </p:cNvPr>
+            <p:cNvCxnSpPr>
+              <a:cxnSpLocks/>
+              <a:stCxn id="136" idx="0"/>
+              <a:endCxn id="139" idx="2"/>
+            </p:cNvCxnSpPr>
+            <p:nvPr/>
+          </p:nvCxnSpPr>
+          <p:spPr>
+            <a:xfrm flipV="1">
+              <a:off x="3428999" y="2016727"/>
+              <a:ext cx="0" cy="180812"/>
+            </a:xfrm>
+            <a:prstGeom prst="straightConnector1">
+              <a:avLst/>
+            </a:prstGeom>
+            <a:ln>
+              <a:solidFill>
+                <a:schemeClr val="tx1"/>
+              </a:solidFill>
+              <a:headEnd type="none" w="med" len="med"/>
+              <a:tailEnd type="triangle" w="med" len="med"/>
+            </a:ln>
+            <a:effectLst>
+              <a:outerShdw blurRad="50800" dist="38100" dir="2700000" algn="tl" rotWithShape="0">
+                <a:prstClr val="black">
+                  <a:alpha val="40000"/>
+                </a:prstClr>
+              </a:outerShdw>
+            </a:effectLst>
+          </p:spPr>
+          <p:style>
+            <a:lnRef idx="1">
+              <a:schemeClr val="accent1"/>
+            </a:lnRef>
+            <a:fillRef idx="0">
+              <a:schemeClr val="accent1"/>
+            </a:fillRef>
+            <a:effectRef idx="0">
+              <a:schemeClr val="accent1"/>
+            </a:effectRef>
+            <a:fontRef idx="minor">
+              <a:schemeClr val="tx1"/>
+            </a:fontRef>
+          </p:style>
+        </p:cxnSp>
+        <p:cxnSp>
+          <p:nvCxnSpPr>
+            <p:cNvPr id="149" name="直接箭头连接符 148">
+              <a:extLst>
+                <a:ext uri="{FF2B5EF4-FFF2-40B4-BE49-F238E27FC236}">
+                  <a16:creationId xmlns:a16="http://schemas.microsoft.com/office/drawing/2014/main" id="{01956D81-8DF4-4D16-A061-669AB3AAA582}"/>
+                </a:ext>
+              </a:extLst>
+            </p:cNvPr>
+            <p:cNvCxnSpPr>
+              <a:cxnSpLocks/>
+              <a:stCxn id="139" idx="0"/>
+              <a:endCxn id="141" idx="2"/>
+            </p:cNvCxnSpPr>
+            <p:nvPr/>
+          </p:nvCxnSpPr>
+          <p:spPr>
+            <a:xfrm flipV="1">
+              <a:off x="3428998" y="1552109"/>
+              <a:ext cx="0" cy="180810"/>
+            </a:xfrm>
+            <a:prstGeom prst="straightConnector1">
+              <a:avLst/>
+            </a:prstGeom>
+            <a:ln>
+              <a:solidFill>
+                <a:schemeClr val="tx1"/>
+              </a:solidFill>
+              <a:headEnd type="none" w="med" len="med"/>
+              <a:tailEnd type="triangle" w="med" len="med"/>
+            </a:ln>
+            <a:effectLst>
+              <a:outerShdw blurRad="50800" dist="38100" dir="2700000" algn="tl" rotWithShape="0">
+                <a:prstClr val="black">
+                  <a:alpha val="40000"/>
+                </a:prstClr>
+              </a:outerShdw>
+            </a:effectLst>
+          </p:spPr>
+          <p:style>
+            <a:lnRef idx="1">
+              <a:schemeClr val="accent1"/>
+            </a:lnRef>
+            <a:fillRef idx="0">
+              <a:schemeClr val="accent1"/>
+            </a:fillRef>
+            <a:effectRef idx="0">
+              <a:schemeClr val="accent1"/>
+            </a:effectRef>
+            <a:fontRef idx="minor">
+              <a:schemeClr val="tx1"/>
+            </a:fontRef>
+          </p:style>
+        </p:cxnSp>
+      </p:grpSp>
+    </p:spTree>
+    <p:extLst>
+      <p:ext uri="{BB962C8B-B14F-4D97-AF65-F5344CB8AC3E}">
+        <p14:creationId xmlns:p14="http://schemas.microsoft.com/office/powerpoint/2010/main" val="2199406870"/>
+      </p:ext>
+    </p:extLst>
+  </p:cSld>
+  <p:clrMapOvr>
+    <a:masterClrMapping/>
+  </p:clrMapOvr>
+</p:sld>
+</file>
+
+<file path=ppt/slides/slide7.xml><?xml version="1.0" encoding="utf-8"?>
+<p:sld xmlns:a="http://schemas.openxmlformats.org/drawingml/2006/main" xmlns:r="http://schemas.openxmlformats.org/officeDocument/2006/relationships" xmlns:p="http://schemas.openxmlformats.org/presentationml/2006/main">
+  <p:cSld>
+    <p:spTree>
+      <p:nvGrpSpPr>
+        <p:cNvPr id="1" name="Shape 158"/>
+        <p:cNvGrpSpPr/>
+        <p:nvPr/>
+      </p:nvGrpSpPr>
+      <p:grpSpPr>
+        <a:xfrm>
+          <a:off x="0" y="0"/>
+          <a:ext cx="0" cy="0"/>
+          <a:chOff x="0" y="0"/>
+          <a:chExt cx="0" cy="0"/>
+        </a:xfrm>
+      </p:grpSpPr>
+      <p:grpSp>
+        <p:nvGrpSpPr>
           <p:cNvPr id="307" name="组合 306">
             <a:extLst>
               <a:ext uri="{FF2B5EF4-FFF2-40B4-BE49-F238E27FC236}">
@@ -11851,7 +14893,7 @@
 </p:sld>
 </file>
 
-<file path=ppt/slides/slide7.xml><?xml version="1.0" encoding="utf-8"?>
+<file path=ppt/slides/slide8.xml><?xml version="1.0" encoding="utf-8"?>
 <p:sld xmlns:a="http://schemas.openxmlformats.org/drawingml/2006/main" xmlns:r="http://schemas.openxmlformats.org/officeDocument/2006/relationships" xmlns:p="http://schemas.openxmlformats.org/presentationml/2006/main">
   <p:cSld>
     <p:spTree>
@@ -13862,7 +16904,7 @@
 </p:sld>
 </file>
 
-<file path=ppt/slides/slide8.xml><?xml version="1.0" encoding="utf-8"?>
+<file path=ppt/slides/slide9.xml><?xml version="1.0" encoding="utf-8"?>
 <p:sld xmlns:a="http://schemas.openxmlformats.org/drawingml/2006/main" xmlns:r="http://schemas.openxmlformats.org/officeDocument/2006/relationships" xmlns:p="http://schemas.openxmlformats.org/presentationml/2006/main">
   <p:cSld>
     <p:spTree>
@@ -13899,8 +16941,8 @@
             <a:chExt cx="4910387" cy="4001547"/>
           </a:xfrm>
         </p:grpSpPr>
-        <mc:AlternateContent xmlns:mc="http://schemas.openxmlformats.org/markup-compatibility/2006">
-          <mc:Choice xmlns:a14="http://schemas.microsoft.com/office/drawing/2010/main" Requires="a14">
+        <mc:AlternateContent xmlns:mc="http://schemas.openxmlformats.org/markup-compatibility/2006" xmlns:a14="http://schemas.microsoft.com/office/drawing/2010/main">
+          <mc:Choice Requires="a14">
             <p:sp>
               <p:nvSpPr>
                 <p:cNvPr id="4" name="矩形: 圆角 3">
@@ -14096,7 +17138,7 @@
               </p:txBody>
             </p:sp>
           </mc:Choice>
-          <mc:Fallback>
+          <mc:Fallback xmlns="">
             <p:sp>
               <p:nvSpPr>
                 <p:cNvPr id="4" name="矩形: 圆角 3">

</xml_diff>